<commit_message>
CMSIS-Stream - Overview added
</commit_message>
<xml_diff>
--- a/CMSIS/DoxyGen/General/src/images/overview.pptx
+++ b/CMSIS/DoxyGen/General/src/images/overview.pptx
@@ -5,13 +5,14 @@
     <p:sldMasterId id="2147483661" r:id="rId1"/>
   </p:sldMasterIdLst>
   <p:notesMasterIdLst>
-    <p:notesMasterId r:id="rId3"/>
+    <p:notesMasterId r:id="rId4"/>
   </p:notesMasterIdLst>
   <p:handoutMasterIdLst>
-    <p:handoutMasterId r:id="rId4"/>
+    <p:handoutMasterId r:id="rId5"/>
   </p:handoutMasterIdLst>
   <p:sldIdLst>
     <p:sldId id="3169" r:id="rId2"/>
+    <p:sldId id="2145705746" r:id="rId3"/>
   </p:sldIdLst>
   <p:sldSz cx="12192000" cy="6858000"/>
   <p:notesSz cx="6858000" cy="9144000"/>
@@ -134,6 +135,7 @@
 
 <file path=ppt/authors.xml><?xml version="1.0" encoding="utf-8"?>
 <p188:authorLst xmlns:a="http://schemas.openxmlformats.org/drawingml/2006/main" xmlns:r="http://schemas.openxmlformats.org/officeDocument/2006/relationships" xmlns:p188="http://schemas.microsoft.com/office/powerpoint/2018/8/main">
+  <p188:author id="{797A9D71-878A-96BF-B485-D22B6713C005}" name="Laurent Le Faucheur" initials="LF" userId="S::laurent.lefaucheur@arm.com::5aa590e2-496b-461c-bd3b-d3700c439448" providerId="AD"/>
   <p188:author id="{57F8219C-21D4-9D5D-F788-12D8A401A92F}" name="Reinhard Keil" initials="RK" userId="S::Reinhard.Keil@arm.com::a74c14d9-6dde-4ffd-bc62-ceabab23c919" providerId="AD"/>
   <p188:author id="{045158D8-303A-DFF3-7173-A7DA1BB678DE}" name="Christophe Favergeon" initials="CF" userId="S::christophe.favergeon@arm.com::62b4f1e8-1570-49ec-b7e2-cb2ba94f78f3" providerId="AD"/>
 </p188:authorLst>
@@ -259,7 +261,7 @@
           <a:p>
             <a:fld id="{008FFADC-39A7-449E-8C68-8776E6FB3C1A}" type="datetimeFigureOut">
               <a:rPr lang="en-GB" smtClean="0"/>
-              <a:t>19/05/2023</a:t>
+              <a:t>25/05/2023</a:t>
             </a:fld>
             <a:endParaRPr lang="en-GB"/>
           </a:p>
@@ -436,7 +438,7 @@
           <a:p>
             <a:fld id="{30B9BAAB-B703-4BB5-9D08-B460FC03C23A}" type="datetimeFigureOut">
               <a:rPr lang="en-GB" smtClean="0"/>
-              <a:t>19/05/2023</a:t>
+              <a:t>25/05/2023</a:t>
             </a:fld>
             <a:endParaRPr lang="en-GB"/>
           </a:p>
@@ -885,6 +887,96 @@
     <p:extLst>
       <p:ext uri="{BB962C8B-B14F-4D97-AF65-F5344CB8AC3E}">
         <p14:creationId xmlns:p14="http://schemas.microsoft.com/office/powerpoint/2010/main" val="1559631895"/>
+      </p:ext>
+    </p:extLst>
+  </p:cSld>
+  <p:clrMapOvr>
+    <a:masterClrMapping/>
+  </p:clrMapOvr>
+</p:notes>
+</file>
+
+<file path=ppt/notesSlides/notesSlide2.xml><?xml version="1.0" encoding="utf-8"?>
+<p:notes xmlns:a="http://schemas.openxmlformats.org/drawingml/2006/main" xmlns:r="http://schemas.openxmlformats.org/officeDocument/2006/relationships" xmlns:p="http://schemas.openxmlformats.org/presentationml/2006/main">
+  <p:cSld>
+    <p:spTree>
+      <p:nvGrpSpPr>
+        <p:cNvPr id="1" name=""/>
+        <p:cNvGrpSpPr/>
+        <p:nvPr/>
+      </p:nvGrpSpPr>
+      <p:grpSpPr>
+        <a:xfrm>
+          <a:off x="0" y="0"/>
+          <a:ext cx="0" cy="0"/>
+          <a:chOff x="0" y="0"/>
+          <a:chExt cx="0" cy="0"/>
+        </a:xfrm>
+      </p:grpSpPr>
+      <p:sp>
+        <p:nvSpPr>
+          <p:cNvPr id="2" name="Slide Image Placeholder 1"/>
+          <p:cNvSpPr>
+            <a:spLocks noGrp="1" noRot="1" noChangeAspect="1"/>
+          </p:cNvSpPr>
+          <p:nvPr>
+            <p:ph type="sldImg"/>
+          </p:nvPr>
+        </p:nvSpPr>
+        <p:spPr/>
+      </p:sp>
+      <p:sp>
+        <p:nvSpPr>
+          <p:cNvPr id="3" name="Notes Placeholder 2"/>
+          <p:cNvSpPr>
+            <a:spLocks noGrp="1"/>
+          </p:cNvSpPr>
+          <p:nvPr>
+            <p:ph type="body" idx="1"/>
+          </p:nvPr>
+        </p:nvSpPr>
+        <p:spPr/>
+        <p:txBody>
+          <a:bodyPr/>
+          <a:lstStyle/>
+          <a:p>
+            <a:endParaRPr lang="en-US"/>
+          </a:p>
+        </p:txBody>
+      </p:sp>
+      <p:sp>
+        <p:nvSpPr>
+          <p:cNvPr id="4" name="Slide Number Placeholder 3"/>
+          <p:cNvSpPr>
+            <a:spLocks noGrp="1"/>
+          </p:cNvSpPr>
+          <p:nvPr>
+            <p:ph type="sldNum" sz="quarter" idx="5"/>
+          </p:nvPr>
+        </p:nvSpPr>
+        <p:spPr/>
+        <p:txBody>
+          <a:bodyPr/>
+          <a:lstStyle/>
+          <a:p>
+            <a:pPr>
+              <a:defRPr/>
+            </a:pPr>
+            <a:fld id="{3B16354E-6974-4833-AB87-3220A0835E84}" type="slidenum">
+              <a:rPr lang="en-US" altLang="en-US" smtClean="0"/>
+              <a:pPr>
+                <a:defRPr/>
+              </a:pPr>
+              <a:t>2</a:t>
+            </a:fld>
+            <a:endParaRPr lang="en-US" altLang="en-US"/>
+          </a:p>
+        </p:txBody>
+      </p:sp>
+    </p:spTree>
+    <p:extLst>
+      <p:ext uri="{BB962C8B-B14F-4D97-AF65-F5344CB8AC3E}">
+        <p14:creationId xmlns:p14="http://schemas.microsoft.com/office/powerpoint/2010/main" val="3958759392"/>
       </p:ext>
     </p:extLst>
   </p:cSld>
@@ -6692,7 +6784,7 @@
                 </a:solidFill>
                 <a:latin typeface="Calibri"/>
               </a:rPr>
-              <a:t>CMSIS-RTOS2</a:t>
+              <a:t>CMSIS-Driver</a:t>
             </a:r>
           </a:p>
           <a:p>
@@ -6704,7 +6796,7 @@
                 </a:solidFill>
                 <a:latin typeface="Calibri"/>
               </a:rPr>
-              <a:t>Real-time execution</a:t>
+              <a:t>Middleware I/F</a:t>
             </a:r>
           </a:p>
         </p:txBody>
@@ -6857,6 +6949,73 @@
           <a:xfrm>
             <a:off x="6950054" y="2603098"/>
             <a:ext cx="2489822" cy="630000"/>
+          </a:xfrm>
+          <a:prstGeom prst="rect">
+            <a:avLst/>
+          </a:prstGeom>
+          <a:solidFill>
+            <a:schemeClr val="accent3">
+              <a:lumMod val="50000"/>
+            </a:schemeClr>
+          </a:solidFill>
+          <a:ln>
+            <a:noFill/>
+          </a:ln>
+          <a:effectLst/>
+        </p:spPr>
+        <p:style>
+          <a:lnRef idx="1">
+            <a:schemeClr val="accent1"/>
+          </a:lnRef>
+          <a:fillRef idx="3">
+            <a:schemeClr val="accent1"/>
+          </a:fillRef>
+          <a:effectRef idx="2">
+            <a:schemeClr val="accent1"/>
+          </a:effectRef>
+          <a:fontRef idx="minor">
+            <a:schemeClr val="lt1"/>
+          </a:fontRef>
+        </p:style>
+        <p:txBody>
+          <a:bodyPr lIns="35973" rIns="35973" rtlCol="0" anchor="ctr"/>
+          <a:lstStyle/>
+          <a:p>
+            <a:pPr algn="ctr" defTabSz="914126"/>
+            <a:r>
+              <a:rPr lang="en-US" sz="1400" dirty="0">
+                <a:solidFill>
+                  <a:prstClr val="white"/>
+                </a:solidFill>
+                <a:latin typeface="Calibri"/>
+              </a:rPr>
+              <a:t>CMSIS-SVD</a:t>
+            </a:r>
+          </a:p>
+          <a:p>
+            <a:pPr algn="ctr" defTabSz="914126"/>
+            <a:r>
+              <a:rPr lang="en-US" sz="1100" dirty="0">
+                <a:solidFill>
+                  <a:prstClr val="white"/>
+                </a:solidFill>
+                <a:latin typeface="Calibri"/>
+              </a:rPr>
+              <a:t>Peripheral description</a:t>
+            </a:r>
+          </a:p>
+        </p:txBody>
+      </p:sp>
+      <p:sp>
+        <p:nvSpPr>
+          <p:cNvPr id="18" name="Rectangle 17"/>
+          <p:cNvSpPr/>
+          <p:nvPr/>
+        </p:nvSpPr>
+        <p:spPr>
+          <a:xfrm>
+            <a:off x="6950054" y="3513369"/>
+            <a:ext cx="1224000" cy="630000"/>
           </a:xfrm>
           <a:prstGeom prst="rect">
             <a:avLst/>
@@ -6898,7 +7057,7 @@
                 </a:solidFill>
                 <a:latin typeface="Calibri"/>
               </a:rPr>
-              <a:t>CMSIS-SVD</a:t>
+              <a:t>CMSIS-DAP</a:t>
             </a:r>
           </a:p>
           <a:p>
@@ -6910,30 +7069,27 @@
                 </a:solidFill>
                 <a:latin typeface="Calibri"/>
               </a:rPr>
-              <a:t>Peripheral description</a:t>
-            </a:r>
-          </a:p>
-        </p:txBody>
-      </p:sp>
-      <p:sp>
-        <p:nvSpPr>
-          <p:cNvPr id="18" name="Rectangle 17"/>
+              <a:t>Debug access</a:t>
+            </a:r>
+          </a:p>
+        </p:txBody>
+      </p:sp>
+      <p:sp>
+        <p:nvSpPr>
+          <p:cNvPr id="15" name="Rectangle 14"/>
           <p:cNvSpPr/>
           <p:nvPr/>
         </p:nvSpPr>
         <p:spPr>
           <a:xfrm>
-            <a:off x="6950054" y="3513369"/>
-            <a:ext cx="1224000" cy="630000"/>
+            <a:off x="1890077" y="2601497"/>
+            <a:ext cx="1224000" cy="629836"/>
           </a:xfrm>
           <a:prstGeom prst="rect">
             <a:avLst/>
           </a:prstGeom>
           <a:solidFill>
-            <a:schemeClr val="accent2">
-              <a:lumMod val="90000"/>
-              <a:lumOff val="10000"/>
-            </a:schemeClr>
+            <a:schemeClr val="accent1"/>
           </a:solidFill>
           <a:ln>
             <a:noFill/>
@@ -6966,7 +7122,7 @@
                 </a:solidFill>
                 <a:latin typeface="Calibri"/>
               </a:rPr>
-              <a:t>CMSIS-DAP</a:t>
+              <a:t>CMSIS-RTOS2</a:t>
             </a:r>
           </a:p>
           <a:p>
@@ -6978,72 +7134,7 @@
                 </a:solidFill>
                 <a:latin typeface="Calibri"/>
               </a:rPr>
-              <a:t>Debug access</a:t>
-            </a:r>
-          </a:p>
-        </p:txBody>
-      </p:sp>
-      <p:sp>
-        <p:nvSpPr>
-          <p:cNvPr id="15" name="Rectangle 14"/>
-          <p:cNvSpPr/>
-          <p:nvPr/>
-        </p:nvSpPr>
-        <p:spPr>
-          <a:xfrm>
-            <a:off x="1890077" y="2601497"/>
-            <a:ext cx="1224000" cy="629836"/>
-          </a:xfrm>
-          <a:prstGeom prst="rect">
-            <a:avLst/>
-          </a:prstGeom>
-          <a:solidFill>
-            <a:schemeClr val="accent1"/>
-          </a:solidFill>
-          <a:ln>
-            <a:noFill/>
-          </a:ln>
-          <a:effectLst/>
-        </p:spPr>
-        <p:style>
-          <a:lnRef idx="1">
-            <a:schemeClr val="accent1"/>
-          </a:lnRef>
-          <a:fillRef idx="3">
-            <a:schemeClr val="accent1"/>
-          </a:fillRef>
-          <a:effectRef idx="2">
-            <a:schemeClr val="accent1"/>
-          </a:effectRef>
-          <a:fontRef idx="minor">
-            <a:schemeClr val="lt1"/>
-          </a:fontRef>
-        </p:style>
-        <p:txBody>
-          <a:bodyPr lIns="35973" rIns="35973" rtlCol="0" anchor="ctr"/>
-          <a:lstStyle/>
-          <a:p>
-            <a:pPr algn="ctr" defTabSz="914126"/>
-            <a:r>
-              <a:rPr lang="en-US" sz="1400" dirty="0">
-                <a:solidFill>
-                  <a:prstClr val="white"/>
-                </a:solidFill>
-                <a:latin typeface="Calibri"/>
-              </a:rPr>
-              <a:t>CMSIS-Driver</a:t>
-            </a:r>
-          </a:p>
-          <a:p>
-            <a:pPr algn="ctr" defTabSz="914126"/>
-            <a:r>
-              <a:rPr lang="en-US" sz="1100" dirty="0">
-                <a:solidFill>
-                  <a:prstClr val="white"/>
-                </a:solidFill>
-                <a:latin typeface="Calibri"/>
-              </a:rPr>
-              <a:t>Middleware I/F</a:t>
+              <a:t>Real-time execution</a:t>
             </a:r>
           </a:p>
         </p:txBody>
@@ -7493,7 +7584,7 @@
         </p:nvSpPr>
         <p:spPr>
           <a:xfrm>
-            <a:off x="9670615" y="2986183"/>
+            <a:off x="9698040" y="1652856"/>
             <a:ext cx="1476000" cy="1097280"/>
           </a:xfrm>
           <a:prstGeom prst="rect">
@@ -7584,8 +7675,98 @@
         </p:nvSpPr>
         <p:spPr>
           <a:xfrm>
-            <a:off x="9670796" y="1655656"/>
+            <a:off x="9703097" y="4673389"/>
             <a:ext cx="1476000" cy="1097280"/>
+          </a:xfrm>
+          <a:prstGeom prst="rect">
+            <a:avLst/>
+          </a:prstGeom>
+          <a:solidFill>
+            <a:schemeClr val="accent3">
+              <a:lumMod val="50000"/>
+            </a:schemeClr>
+          </a:solidFill>
+          <a:ln>
+            <a:noFill/>
+          </a:ln>
+          <a:effectLst/>
+        </p:spPr>
+        <p:style>
+          <a:lnRef idx="1">
+            <a:schemeClr val="accent1"/>
+          </a:lnRef>
+          <a:fillRef idx="3">
+            <a:schemeClr val="accent1"/>
+          </a:fillRef>
+          <a:effectRef idx="2">
+            <a:schemeClr val="accent1"/>
+          </a:effectRef>
+          <a:fontRef idx="minor">
+            <a:schemeClr val="lt1"/>
+          </a:fontRef>
+        </p:style>
+        <p:txBody>
+          <a:bodyPr lIns="35973" rIns="35973" rtlCol="0" anchor="ctr"/>
+          <a:lstStyle/>
+          <a:p>
+            <a:pPr algn="ctr" defTabSz="914126"/>
+            <a:r>
+              <a:rPr lang="en-US" sz="1400" dirty="0">
+                <a:solidFill>
+                  <a:prstClr val="white"/>
+                </a:solidFill>
+                <a:latin typeface="Calibri"/>
+              </a:rPr>
+              <a:t>CMSIS-Pack</a:t>
+            </a:r>
+          </a:p>
+          <a:p>
+            <a:pPr algn="ctr" defTabSz="914126"/>
+            <a:r>
+              <a:rPr lang="en-US" sz="1100" dirty="0">
+                <a:solidFill>
+                  <a:prstClr val="white"/>
+                </a:solidFill>
+                <a:latin typeface="Calibri"/>
+              </a:rPr>
+              <a:t>Software packaging </a:t>
+            </a:r>
+            <a:br>
+              <a:rPr lang="en-US" sz="1100" dirty="0">
+                <a:solidFill>
+                  <a:prstClr val="white"/>
+                </a:solidFill>
+                <a:latin typeface="Calibri"/>
+              </a:rPr>
+            </a:br>
+            <a:r>
+              <a:rPr lang="en-US" sz="1100" dirty="0">
+                <a:solidFill>
+                  <a:prstClr val="white"/>
+                </a:solidFill>
+                <a:latin typeface="Calibri"/>
+              </a:rPr>
+              <a:t>and delivery</a:t>
+            </a:r>
+          </a:p>
+        </p:txBody>
+      </p:sp>
+      <p:sp>
+        <p:nvSpPr>
+          <p:cNvPr id="11" name="Rectangle 10">
+            <a:extLst>
+              <a:ext uri="{FF2B5EF4-FFF2-40B4-BE49-F238E27FC236}">
+                <a16:creationId xmlns:a16="http://schemas.microsoft.com/office/drawing/2014/main" id="{25787E4F-7946-ED57-94F9-B1FF9C1CB396}"/>
+              </a:ext>
+            </a:extLst>
+          </p:cNvPr>
+          <p:cNvSpPr/>
+          <p:nvPr/>
+        </p:nvSpPr>
+        <p:spPr>
+          <a:xfrm>
+            <a:off x="9711000" y="3163123"/>
+            <a:ext cx="1463040" cy="1097280"/>
           </a:xfrm>
           <a:prstGeom prst="rect">
             <a:avLst/>
@@ -7627,7 +7808,7 @@
                 </a:solidFill>
                 <a:latin typeface="Calibri"/>
               </a:rPr>
-              <a:t>CMSIS-Pack</a:t>
+              <a:t>CMSIS-Stream</a:t>
             </a:r>
           </a:p>
           <a:p>
@@ -7639,7 +7820,7 @@
                 </a:solidFill>
                 <a:latin typeface="Calibri"/>
               </a:rPr>
-              <a:t>Software packaging </a:t>
+              <a:t>Optimized </a:t>
             </a:r>
             <a:br>
               <a:rPr lang="en-US" sz="1100" dirty="0">
@@ -7656,17 +7837,34 @@
                 </a:solidFill>
                 <a:latin typeface="Calibri"/>
               </a:rPr>
-              <a:t>and delivery</a:t>
-            </a:r>
-          </a:p>
-        </p:txBody>
-      </p:sp>
-      <p:sp>
-        <p:nvSpPr>
-          <p:cNvPr id="11" name="Rectangle 10">
+              <a:t>data streaming</a:t>
+            </a:r>
+            <a:br>
+              <a:rPr lang="en-US" sz="1100" dirty="0">
+                <a:solidFill>
+                  <a:prstClr val="white"/>
+                </a:solidFill>
+                <a:latin typeface="Calibri"/>
+              </a:rPr>
+            </a:br>
+            <a:r>
+              <a:rPr lang="en-US" sz="1100" dirty="0">
+                <a:solidFill>
+                  <a:prstClr val="white"/>
+                </a:solidFill>
+                <a:latin typeface="Calibri"/>
+              </a:rPr>
+              <a:t>for ML and DSP</a:t>
+            </a:r>
+          </a:p>
+        </p:txBody>
+      </p:sp>
+      <p:sp>
+        <p:nvSpPr>
+          <p:cNvPr id="14" name="Rectangle 13">
             <a:extLst>
               <a:ext uri="{FF2B5EF4-FFF2-40B4-BE49-F238E27FC236}">
-                <a16:creationId xmlns:a16="http://schemas.microsoft.com/office/drawing/2014/main" id="{25787E4F-7946-ED57-94F9-B1FF9C1CB396}"/>
+                <a16:creationId xmlns:a16="http://schemas.microsoft.com/office/drawing/2014/main" id="{B76B8988-4DC8-EBEF-A868-2050A2C79754}"/>
               </a:ext>
             </a:extLst>
           </p:cNvPr>
@@ -7675,8 +7873,115 @@
         </p:nvSpPr>
         <p:spPr>
           <a:xfrm>
-            <a:off x="9677095" y="4278611"/>
-            <a:ext cx="1463040" cy="1491324"/>
+            <a:off x="621624" y="6001345"/>
+            <a:ext cx="274320" cy="274320"/>
+          </a:xfrm>
+          <a:prstGeom prst="rect">
+            <a:avLst/>
+          </a:prstGeom>
+          <a:solidFill>
+            <a:schemeClr val="accent1"/>
+          </a:solidFill>
+          <a:ln>
+            <a:noFill/>
+          </a:ln>
+        </p:spPr>
+        <p:style>
+          <a:lnRef idx="2">
+            <a:schemeClr val="accent1">
+              <a:shade val="50000"/>
+            </a:schemeClr>
+          </a:lnRef>
+          <a:fillRef idx="1">
+            <a:schemeClr val="accent1"/>
+          </a:fillRef>
+          <a:effectRef idx="0">
+            <a:schemeClr val="accent1"/>
+          </a:effectRef>
+          <a:fontRef idx="minor">
+            <a:schemeClr val="lt1"/>
+          </a:fontRef>
+        </p:style>
+        <p:txBody>
+          <a:bodyPr rtlCol="0" anchor="ctr"/>
+          <a:lstStyle/>
+          <a:p>
+            <a:pPr algn="ctr"/>
+            <a:endParaRPr lang="en-US"/>
+          </a:p>
+        </p:txBody>
+      </p:sp>
+      <p:sp>
+        <p:nvSpPr>
+          <p:cNvPr id="21" name="TextBox 20">
+            <a:extLst>
+              <a:ext uri="{FF2B5EF4-FFF2-40B4-BE49-F238E27FC236}">
+                <a16:creationId xmlns:a16="http://schemas.microsoft.com/office/drawing/2014/main" id="{25940807-92AD-0538-1813-B809799A1B8C}"/>
+              </a:ext>
+            </a:extLst>
+          </p:cNvPr>
+          <p:cNvSpPr txBox="1"/>
+          <p:nvPr/>
+        </p:nvSpPr>
+        <p:spPr>
+          <a:xfrm>
+            <a:off x="966023" y="6042944"/>
+            <a:ext cx="4712736" cy="193899"/>
+          </a:xfrm>
+          <a:prstGeom prst="rect">
+            <a:avLst/>
+          </a:prstGeom>
+          <a:noFill/>
+        </p:spPr>
+        <p:txBody>
+          <a:bodyPr wrap="square" lIns="0" tIns="0" rIns="0" bIns="0" rtlCol="0">
+            <a:spAutoFit/>
+          </a:bodyPr>
+          <a:lstStyle/>
+          <a:p>
+            <a:pPr marL="0" indent="0" algn="l" defTabSz="914400" rtl="0" eaLnBrk="1" latinLnBrk="0" hangingPunct="1">
+              <a:lnSpc>
+                <a:spcPct val="90000"/>
+              </a:lnSpc>
+              <a:spcBef>
+                <a:spcPts val="0"/>
+              </a:spcBef>
+              <a:spcAft>
+                <a:spcPts val="600"/>
+              </a:spcAft>
+              <a:buFont typeface="Arial" panose="020B0604020202020204" pitchFamily="34" charset="0"/>
+              <a:buNone/>
+            </a:pPr>
+            <a:r>
+              <a:rPr lang="en-US" sz="1400" kern="1200" dirty="0">
+                <a:solidFill>
+                  <a:schemeClr val="tx2"/>
+                </a:solidFill>
+                <a:latin typeface="+mn-lt"/>
+                <a:ea typeface="+mn-ea"/>
+                <a:cs typeface="+mn-cs"/>
+              </a:rPr>
+              <a:t>Software components for the Arm Cortex processor target</a:t>
+            </a:r>
+          </a:p>
+        </p:txBody>
+      </p:sp>
+      <p:sp>
+        <p:nvSpPr>
+          <p:cNvPr id="22" name="Rectangle 21">
+            <a:extLst>
+              <a:ext uri="{FF2B5EF4-FFF2-40B4-BE49-F238E27FC236}">
+                <a16:creationId xmlns:a16="http://schemas.microsoft.com/office/drawing/2014/main" id="{5B94244A-8A3B-C963-76C3-49038BDE4CA3}"/>
+              </a:ext>
+            </a:extLst>
+          </p:cNvPr>
+          <p:cNvSpPr/>
+          <p:nvPr/>
+        </p:nvSpPr>
+        <p:spPr>
+          <a:xfrm>
+            <a:off x="5529491" y="6011492"/>
+            <a:ext cx="274320" cy="274320"/>
           </a:xfrm>
           <a:prstGeom prst="rect">
             <a:avLst/>
@@ -7690,221 +7995,6 @@
           <a:ln>
             <a:noFill/>
           </a:ln>
-          <a:effectLst/>
-        </p:spPr>
-        <p:style>
-          <a:lnRef idx="1">
-            <a:schemeClr val="accent1"/>
-          </a:lnRef>
-          <a:fillRef idx="3">
-            <a:schemeClr val="accent1"/>
-          </a:fillRef>
-          <a:effectRef idx="2">
-            <a:schemeClr val="accent1"/>
-          </a:effectRef>
-          <a:fontRef idx="minor">
-            <a:schemeClr val="lt1"/>
-          </a:fontRef>
-        </p:style>
-        <p:txBody>
-          <a:bodyPr lIns="35973" rIns="35973" rtlCol="0" anchor="ctr"/>
-          <a:lstStyle/>
-          <a:p>
-            <a:pPr algn="ctr" defTabSz="914126"/>
-            <a:r>
-              <a:rPr lang="en-US" sz="1400" dirty="0">
-                <a:solidFill>
-                  <a:prstClr val="white"/>
-                </a:solidFill>
-                <a:latin typeface="Calibri"/>
-              </a:rPr>
-              <a:t>CMSIS-Stream</a:t>
-            </a:r>
-          </a:p>
-          <a:p>
-            <a:pPr algn="ctr" defTabSz="914126"/>
-            <a:r>
-              <a:rPr lang="en-US" sz="1100" dirty="0">
-                <a:solidFill>
-                  <a:prstClr val="white"/>
-                </a:solidFill>
-                <a:latin typeface="Calibri"/>
-              </a:rPr>
-              <a:t>Optimized </a:t>
-            </a:r>
-            <a:br>
-              <a:rPr lang="en-US" sz="1100" dirty="0">
-                <a:solidFill>
-                  <a:prstClr val="white"/>
-                </a:solidFill>
-                <a:latin typeface="Calibri"/>
-              </a:rPr>
-            </a:br>
-            <a:r>
-              <a:rPr lang="en-US" sz="1100" dirty="0">
-                <a:solidFill>
-                  <a:prstClr val="white"/>
-                </a:solidFill>
-                <a:latin typeface="Calibri"/>
-              </a:rPr>
-              <a:t>data streaming</a:t>
-            </a:r>
-            <a:br>
-              <a:rPr lang="en-US" sz="1100" dirty="0">
-                <a:solidFill>
-                  <a:prstClr val="white"/>
-                </a:solidFill>
-                <a:latin typeface="Calibri"/>
-              </a:rPr>
-            </a:br>
-            <a:r>
-              <a:rPr lang="en-US" sz="1100" dirty="0">
-                <a:solidFill>
-                  <a:prstClr val="white"/>
-                </a:solidFill>
-                <a:latin typeface="Calibri"/>
-              </a:rPr>
-              <a:t>for ML and DSP</a:t>
-            </a:r>
-          </a:p>
-        </p:txBody>
-      </p:sp>
-      <p:sp>
-        <p:nvSpPr>
-          <p:cNvPr id="14" name="Rectangle 13">
-            <a:extLst>
-              <a:ext uri="{FF2B5EF4-FFF2-40B4-BE49-F238E27FC236}">
-                <a16:creationId xmlns:a16="http://schemas.microsoft.com/office/drawing/2014/main" id="{B76B8988-4DC8-EBEF-A868-2050A2C79754}"/>
-              </a:ext>
-            </a:extLst>
-          </p:cNvPr>
-          <p:cNvSpPr/>
-          <p:nvPr/>
-        </p:nvSpPr>
-        <p:spPr>
-          <a:xfrm>
-            <a:off x="1185294" y="6001345"/>
-            <a:ext cx="274320" cy="274320"/>
-          </a:xfrm>
-          <a:prstGeom prst="rect">
-            <a:avLst/>
-          </a:prstGeom>
-          <a:solidFill>
-            <a:schemeClr val="accent1"/>
-          </a:solidFill>
-          <a:ln>
-            <a:noFill/>
-          </a:ln>
-        </p:spPr>
-        <p:style>
-          <a:lnRef idx="2">
-            <a:schemeClr val="accent1">
-              <a:shade val="50000"/>
-            </a:schemeClr>
-          </a:lnRef>
-          <a:fillRef idx="1">
-            <a:schemeClr val="accent1"/>
-          </a:fillRef>
-          <a:effectRef idx="0">
-            <a:schemeClr val="accent1"/>
-          </a:effectRef>
-          <a:fontRef idx="minor">
-            <a:schemeClr val="lt1"/>
-          </a:fontRef>
-        </p:style>
-        <p:txBody>
-          <a:bodyPr rtlCol="0" anchor="ctr"/>
-          <a:lstStyle/>
-          <a:p>
-            <a:pPr algn="ctr"/>
-            <a:endParaRPr lang="en-US"/>
-          </a:p>
-        </p:txBody>
-      </p:sp>
-      <p:sp>
-        <p:nvSpPr>
-          <p:cNvPr id="21" name="TextBox 20">
-            <a:extLst>
-              <a:ext uri="{FF2B5EF4-FFF2-40B4-BE49-F238E27FC236}">
-                <a16:creationId xmlns:a16="http://schemas.microsoft.com/office/drawing/2014/main" id="{25940807-92AD-0538-1813-B809799A1B8C}"/>
-              </a:ext>
-            </a:extLst>
-          </p:cNvPr>
-          <p:cNvSpPr txBox="1"/>
-          <p:nvPr/>
-        </p:nvSpPr>
-        <p:spPr>
-          <a:xfrm>
-            <a:off x="1529693" y="6042944"/>
-            <a:ext cx="4712736" cy="193899"/>
-          </a:xfrm>
-          <a:prstGeom prst="rect">
-            <a:avLst/>
-          </a:prstGeom>
-          <a:noFill/>
-        </p:spPr>
-        <p:txBody>
-          <a:bodyPr wrap="square" lIns="0" tIns="0" rIns="0" bIns="0" rtlCol="0">
-            <a:spAutoFit/>
-          </a:bodyPr>
-          <a:lstStyle/>
-          <a:p>
-            <a:pPr marL="0" indent="0" algn="l" defTabSz="914400" rtl="0" eaLnBrk="1" latinLnBrk="0" hangingPunct="1">
-              <a:lnSpc>
-                <a:spcPct val="90000"/>
-              </a:lnSpc>
-              <a:spcBef>
-                <a:spcPts val="0"/>
-              </a:spcBef>
-              <a:spcAft>
-                <a:spcPts val="600"/>
-              </a:spcAft>
-              <a:buFont typeface="Arial" panose="020B0604020202020204" pitchFamily="34" charset="0"/>
-              <a:buNone/>
-            </a:pPr>
-            <a:r>
-              <a:rPr lang="en-US" sz="1400" kern="1200" dirty="0">
-                <a:solidFill>
-                  <a:schemeClr val="tx2"/>
-                </a:solidFill>
-                <a:latin typeface="+mn-lt"/>
-                <a:ea typeface="+mn-ea"/>
-                <a:cs typeface="+mn-cs"/>
-              </a:rPr>
-              <a:t>Software components for the Arm Cortex processor target</a:t>
-            </a:r>
-          </a:p>
-        </p:txBody>
-      </p:sp>
-      <p:sp>
-        <p:nvSpPr>
-          <p:cNvPr id="22" name="Rectangle 21">
-            <a:extLst>
-              <a:ext uri="{FF2B5EF4-FFF2-40B4-BE49-F238E27FC236}">
-                <a16:creationId xmlns:a16="http://schemas.microsoft.com/office/drawing/2014/main" id="{5B94244A-8A3B-C963-76C3-49038BDE4CA3}"/>
-              </a:ext>
-            </a:extLst>
-          </p:cNvPr>
-          <p:cNvSpPr/>
-          <p:nvPr/>
-        </p:nvSpPr>
-        <p:spPr>
-          <a:xfrm>
-            <a:off x="6731505" y="6011492"/>
-            <a:ext cx="274320" cy="274320"/>
-          </a:xfrm>
-          <a:prstGeom prst="rect">
-            <a:avLst/>
-          </a:prstGeom>
-          <a:solidFill>
-            <a:schemeClr val="accent2">
-              <a:lumMod val="90000"/>
-              <a:lumOff val="10000"/>
-            </a:schemeClr>
-          </a:solidFill>
-          <a:ln>
-            <a:noFill/>
-          </a:ln>
         </p:spPr>
         <p:style>
           <a:lnRef idx="2">
@@ -7945,8 +8035,8 @@
         </p:nvSpPr>
         <p:spPr>
           <a:xfrm>
-            <a:off x="7097910" y="6053091"/>
-            <a:ext cx="5057135" cy="193899"/>
+            <a:off x="5895896" y="6053091"/>
+            <a:ext cx="3630151" cy="193899"/>
           </a:xfrm>
           <a:prstGeom prst="rect">
             <a:avLst/>
@@ -8119,10 +8209,3488 @@
           </a:p>
         </p:txBody>
       </p:sp>
+      <p:sp>
+        <p:nvSpPr>
+          <p:cNvPr id="27" name="Rectangle 26">
+            <a:extLst>
+              <a:ext uri="{FF2B5EF4-FFF2-40B4-BE49-F238E27FC236}">
+                <a16:creationId xmlns:a16="http://schemas.microsoft.com/office/drawing/2014/main" id="{FCAF3EC9-76EC-E1CB-7C51-C482908BA5A2}"/>
+              </a:ext>
+            </a:extLst>
+          </p:cNvPr>
+          <p:cNvSpPr/>
+          <p:nvPr/>
+        </p:nvSpPr>
+        <p:spPr>
+          <a:xfrm>
+            <a:off x="9705317" y="6017250"/>
+            <a:ext cx="274320" cy="274320"/>
+          </a:xfrm>
+          <a:prstGeom prst="rect">
+            <a:avLst/>
+          </a:prstGeom>
+          <a:solidFill>
+            <a:schemeClr val="accent3">
+              <a:lumMod val="50000"/>
+            </a:schemeClr>
+          </a:solidFill>
+          <a:ln>
+            <a:noFill/>
+          </a:ln>
+        </p:spPr>
+        <p:style>
+          <a:lnRef idx="2">
+            <a:schemeClr val="accent1">
+              <a:shade val="50000"/>
+            </a:schemeClr>
+          </a:lnRef>
+          <a:fillRef idx="1">
+            <a:schemeClr val="accent1"/>
+          </a:fillRef>
+          <a:effectRef idx="0">
+            <a:schemeClr val="accent1"/>
+          </a:effectRef>
+          <a:fontRef idx="minor">
+            <a:schemeClr val="lt1"/>
+          </a:fontRef>
+        </p:style>
+        <p:txBody>
+          <a:bodyPr rtlCol="0" anchor="ctr"/>
+          <a:lstStyle/>
+          <a:p>
+            <a:pPr algn="ctr"/>
+            <a:endParaRPr lang="en-US"/>
+          </a:p>
+        </p:txBody>
+      </p:sp>
+      <p:sp>
+        <p:nvSpPr>
+          <p:cNvPr id="29" name="TextBox 28">
+            <a:extLst>
+              <a:ext uri="{FF2B5EF4-FFF2-40B4-BE49-F238E27FC236}">
+                <a16:creationId xmlns:a16="http://schemas.microsoft.com/office/drawing/2014/main" id="{57F361F5-5E38-26C2-E57A-360597CF4923}"/>
+              </a:ext>
+            </a:extLst>
+          </p:cNvPr>
+          <p:cNvSpPr txBox="1"/>
+          <p:nvPr/>
+        </p:nvSpPr>
+        <p:spPr>
+          <a:xfrm>
+            <a:off x="10071722" y="6058849"/>
+            <a:ext cx="3630151" cy="193899"/>
+          </a:xfrm>
+          <a:prstGeom prst="rect">
+            <a:avLst/>
+          </a:prstGeom>
+          <a:noFill/>
+        </p:spPr>
+        <p:txBody>
+          <a:bodyPr wrap="square" lIns="0" tIns="0" rIns="0" bIns="0" rtlCol="0">
+            <a:spAutoFit/>
+          </a:bodyPr>
+          <a:lstStyle/>
+          <a:p>
+            <a:pPr marL="0" indent="0" algn="l" defTabSz="914400" rtl="0" eaLnBrk="1" latinLnBrk="0" hangingPunct="1">
+              <a:lnSpc>
+                <a:spcPct val="90000"/>
+              </a:lnSpc>
+              <a:spcBef>
+                <a:spcPts val="0"/>
+              </a:spcBef>
+              <a:spcAft>
+                <a:spcPts val="600"/>
+              </a:spcAft>
+              <a:buFont typeface="Arial" panose="020B0604020202020204" pitchFamily="34" charset="0"/>
+              <a:buNone/>
+            </a:pPr>
+            <a:r>
+              <a:rPr lang="en-US" sz="1400" dirty="0">
+                <a:solidFill>
+                  <a:schemeClr val="tx2"/>
+                </a:solidFill>
+              </a:rPr>
+              <a:t>Specifications</a:t>
+            </a:r>
+            <a:endParaRPr lang="en-US" sz="1400" kern="1200" dirty="0">
+              <a:solidFill>
+                <a:schemeClr val="tx2"/>
+              </a:solidFill>
+              <a:latin typeface="+mn-lt"/>
+              <a:ea typeface="+mn-ea"/>
+              <a:cs typeface="+mn-cs"/>
+            </a:endParaRPr>
+          </a:p>
+        </p:txBody>
+      </p:sp>
     </p:spTree>
     <p:extLst>
       <p:ext uri="{BB962C8B-B14F-4D97-AF65-F5344CB8AC3E}">
         <p14:creationId xmlns:p14="http://schemas.microsoft.com/office/powerpoint/2010/main" val="4009982871"/>
+      </p:ext>
+    </p:extLst>
+  </p:cSld>
+  <p:clrMapOvr>
+    <a:masterClrMapping/>
+  </p:clrMapOvr>
+</p:sld>
+</file>
+
+<file path=ppt/slides/slide2.xml><?xml version="1.0" encoding="utf-8"?>
+<p:sld xmlns:a="http://schemas.openxmlformats.org/drawingml/2006/main" xmlns:r="http://schemas.openxmlformats.org/officeDocument/2006/relationships" xmlns:p="http://schemas.openxmlformats.org/presentationml/2006/main">
+  <p:cSld>
+    <p:spTree>
+      <p:nvGrpSpPr>
+        <p:cNvPr id="1" name=""/>
+        <p:cNvGrpSpPr/>
+        <p:nvPr/>
+      </p:nvGrpSpPr>
+      <p:grpSpPr>
+        <a:xfrm>
+          <a:off x="0" y="0"/>
+          <a:ext cx="0" cy="0"/>
+          <a:chOff x="0" y="0"/>
+          <a:chExt cx="0" cy="0"/>
+        </a:xfrm>
+      </p:grpSpPr>
+      <p:cxnSp>
+        <p:nvCxnSpPr>
+          <p:cNvPr id="8" name="Straight Connector 7">
+            <a:extLst>
+              <a:ext uri="{FF2B5EF4-FFF2-40B4-BE49-F238E27FC236}">
+                <a16:creationId xmlns:a16="http://schemas.microsoft.com/office/drawing/2014/main" id="{F18289E2-6C0B-C9DC-63E2-894CF6EE6717}"/>
+              </a:ext>
+            </a:extLst>
+          </p:cNvPr>
+          <p:cNvCxnSpPr>
+            <a:cxnSpLocks/>
+          </p:cNvCxnSpPr>
+          <p:nvPr/>
+        </p:nvCxnSpPr>
+        <p:spPr>
+          <a:xfrm flipV="1">
+            <a:off x="6667933" y="4516164"/>
+            <a:ext cx="589418" cy="1"/>
+          </a:xfrm>
+          <a:prstGeom prst="line">
+            <a:avLst/>
+          </a:prstGeom>
+          <a:ln w="19050">
+            <a:solidFill>
+              <a:srgbClr val="00C1DE"/>
+            </a:solidFill>
+          </a:ln>
+        </p:spPr>
+        <p:style>
+          <a:lnRef idx="1">
+            <a:schemeClr val="accent1"/>
+          </a:lnRef>
+          <a:fillRef idx="0">
+            <a:schemeClr val="accent1"/>
+          </a:fillRef>
+          <a:effectRef idx="0">
+            <a:schemeClr val="accent1"/>
+          </a:effectRef>
+          <a:fontRef idx="minor">
+            <a:schemeClr val="tx1"/>
+          </a:fontRef>
+        </p:style>
+      </p:cxnSp>
+      <p:sp>
+        <p:nvSpPr>
+          <p:cNvPr id="9" name="Content Placeholder 3">
+            <a:extLst>
+              <a:ext uri="{FF2B5EF4-FFF2-40B4-BE49-F238E27FC236}">
+                <a16:creationId xmlns:a16="http://schemas.microsoft.com/office/drawing/2014/main" id="{3D52C7F6-A741-78A0-609E-D5A3562D1A25}"/>
+              </a:ext>
+            </a:extLst>
+          </p:cNvPr>
+          <p:cNvSpPr txBox="1">
+            <a:spLocks/>
+          </p:cNvSpPr>
+          <p:nvPr/>
+        </p:nvSpPr>
+        <p:spPr bwMode="auto">
+          <a:xfrm>
+            <a:off x="2336071" y="4069431"/>
+            <a:ext cx="1797769" cy="991507"/>
+          </a:xfrm>
+          <a:prstGeom prst="rect">
+            <a:avLst/>
+          </a:prstGeom>
+          <a:effectLst/>
+        </p:spPr>
+        <p:txBody>
+          <a:bodyPr vert="horz" wrap="square" lIns="0" tIns="0" rIns="0" bIns="0" numCol="1" rtlCol="0" anchor="t" anchorCtr="0" compatLnSpc="1">
+            <a:prstTxWarp prst="textNoShape">
+              <a:avLst/>
+            </a:prstTxWarp>
+            <a:noAutofit/>
+          </a:bodyPr>
+          <a:lstStyle>
+            <a:lvl1pPr marL="0" indent="0" algn="l" rtl="0" eaLnBrk="1" fontAlgn="base" hangingPunct="1">
+              <a:lnSpc>
+                <a:spcPct val="90000"/>
+              </a:lnSpc>
+              <a:spcBef>
+                <a:spcPct val="0"/>
+              </a:spcBef>
+              <a:spcAft>
+                <a:spcPts val="1600"/>
+              </a:spcAft>
+              <a:buFont typeface="Calibri" charset="0"/>
+              <a:buNone/>
+              <a:defRPr sz="2400" kern="1200">
+                <a:solidFill>
+                  <a:srgbClr val="7B7F9C"/>
+                </a:solidFill>
+                <a:effectLst/>
+                <a:latin typeface="+mn-lt"/>
+                <a:ea typeface="ＭＳ Ｐゴシック" charset="0"/>
+                <a:cs typeface="ＭＳ Ｐゴシック" charset="0"/>
+              </a:defRPr>
+            </a:lvl1pPr>
+            <a:lvl2pPr marL="398463" indent="-166688" algn="l" rtl="0" eaLnBrk="1" fontAlgn="base" hangingPunct="1">
+              <a:lnSpc>
+                <a:spcPct val="90000"/>
+              </a:lnSpc>
+              <a:spcBef>
+                <a:spcPct val="0"/>
+              </a:spcBef>
+              <a:spcAft>
+                <a:spcPts val="1200"/>
+              </a:spcAft>
+              <a:buClr>
+                <a:schemeClr val="accent1"/>
+              </a:buClr>
+              <a:buSzPct val="80000"/>
+              <a:buFont typeface="Arial" charset="0"/>
+              <a:buChar char="•"/>
+              <a:defRPr sz="1400" kern="1200">
+                <a:solidFill>
+                  <a:srgbClr val="7B7F9C"/>
+                </a:solidFill>
+                <a:effectLst/>
+                <a:latin typeface="+mn-lt"/>
+                <a:ea typeface="ＭＳ Ｐゴシック" charset="0"/>
+                <a:cs typeface="+mn-cs"/>
+              </a:defRPr>
+            </a:lvl2pPr>
+            <a:lvl3pPr marL="855663" indent="-166688" algn="l" rtl="0" eaLnBrk="1" fontAlgn="base" hangingPunct="1">
+              <a:lnSpc>
+                <a:spcPct val="90000"/>
+              </a:lnSpc>
+              <a:spcBef>
+                <a:spcPct val="0"/>
+              </a:spcBef>
+              <a:spcAft>
+                <a:spcPts val="1200"/>
+              </a:spcAft>
+              <a:buClr>
+                <a:schemeClr val="accent1"/>
+              </a:buClr>
+              <a:buSzPct val="80000"/>
+              <a:buFont typeface="Calibri" charset="0"/>
+              <a:buChar char="–"/>
+              <a:defRPr sz="1400" kern="1200">
+                <a:solidFill>
+                  <a:srgbClr val="7B7F9C"/>
+                </a:solidFill>
+                <a:effectLst/>
+                <a:latin typeface="+mn-lt"/>
+                <a:ea typeface="ＭＳ Ｐゴシック" charset="0"/>
+                <a:cs typeface="+mn-cs"/>
+              </a:defRPr>
+            </a:lvl3pPr>
+            <a:lvl4pPr marL="1201738" indent="-173038" algn="l" rtl="0" eaLnBrk="1" fontAlgn="base" hangingPunct="1">
+              <a:lnSpc>
+                <a:spcPct val="90000"/>
+              </a:lnSpc>
+              <a:spcBef>
+                <a:spcPct val="0"/>
+              </a:spcBef>
+              <a:spcAft>
+                <a:spcPts val="800"/>
+              </a:spcAft>
+              <a:buClr>
+                <a:schemeClr val="accent1"/>
+              </a:buClr>
+              <a:buSzPct val="80000"/>
+              <a:buFont typeface="Wingdings" charset="2"/>
+              <a:buChar char="§"/>
+              <a:defRPr sz="1400" kern="1200">
+                <a:solidFill>
+                  <a:srgbClr val="7B7F9C"/>
+                </a:solidFill>
+                <a:effectLst/>
+                <a:latin typeface="+mn-lt"/>
+                <a:ea typeface="ＭＳ Ｐゴシック" charset="0"/>
+                <a:cs typeface="+mn-cs"/>
+              </a:defRPr>
+            </a:lvl4pPr>
+            <a:lvl5pPr marL="1427163" indent="-168275" algn="l" rtl="0" eaLnBrk="1" fontAlgn="base" hangingPunct="1">
+              <a:lnSpc>
+                <a:spcPct val="90000"/>
+              </a:lnSpc>
+              <a:spcBef>
+                <a:spcPct val="0"/>
+              </a:spcBef>
+              <a:spcAft>
+                <a:spcPts val="800"/>
+              </a:spcAft>
+              <a:buClr>
+                <a:schemeClr val="accent1"/>
+              </a:buClr>
+              <a:buSzPct val="80000"/>
+              <a:buFont typeface="Calibri" charset="0"/>
+              <a:buChar char="–"/>
+              <a:defRPr sz="1400" kern="1200">
+                <a:solidFill>
+                  <a:srgbClr val="7B7F9C"/>
+                </a:solidFill>
+                <a:effectLst/>
+                <a:latin typeface="+mn-lt"/>
+                <a:ea typeface="ＭＳ Ｐゴシック" charset="0"/>
+                <a:cs typeface="+mn-cs"/>
+              </a:defRPr>
+            </a:lvl5pPr>
+            <a:lvl6pPr marL="1655064" indent="-164592" algn="l" defTabSz="914400" rtl="0" eaLnBrk="1" latinLnBrk="0" hangingPunct="1">
+              <a:lnSpc>
+                <a:spcPct val="90000"/>
+              </a:lnSpc>
+              <a:spcBef>
+                <a:spcPts val="0"/>
+              </a:spcBef>
+              <a:spcAft>
+                <a:spcPts val="800"/>
+              </a:spcAft>
+              <a:buClr>
+                <a:schemeClr val="accent1"/>
+              </a:buClr>
+              <a:buSzPct val="80000"/>
+              <a:buFont typeface="Wingdings" panose="05000000000000000000" pitchFamily="2" charset="2"/>
+              <a:buChar char="§"/>
+              <a:defRPr lang="en-US" sz="1800" kern="1200">
+                <a:solidFill>
+                  <a:schemeClr val="tx2"/>
+                </a:solidFill>
+                <a:latin typeface="+mn-lt"/>
+                <a:ea typeface="+mn-ea"/>
+                <a:cs typeface="+mn-cs"/>
+              </a:defRPr>
+            </a:lvl6pPr>
+            <a:lvl7pPr marL="1883664" indent="-164592" algn="l" defTabSz="914400" rtl="0" eaLnBrk="1" latinLnBrk="0" hangingPunct="1">
+              <a:lnSpc>
+                <a:spcPct val="90000"/>
+              </a:lnSpc>
+              <a:spcBef>
+                <a:spcPts val="0"/>
+              </a:spcBef>
+              <a:spcAft>
+                <a:spcPts val="800"/>
+              </a:spcAft>
+              <a:buClr>
+                <a:schemeClr val="accent1"/>
+              </a:buClr>
+              <a:buSzPct val="80000"/>
+              <a:buFont typeface="Calibri" panose="020F0502020204030204" pitchFamily="34" charset="0"/>
+              <a:buChar char="–"/>
+              <a:defRPr lang="en-US" sz="1800" kern="1200">
+                <a:solidFill>
+                  <a:schemeClr val="tx2"/>
+                </a:solidFill>
+                <a:latin typeface="+mn-lt"/>
+                <a:ea typeface="+mn-ea"/>
+                <a:cs typeface="+mn-cs"/>
+              </a:defRPr>
+            </a:lvl7pPr>
+            <a:lvl8pPr marL="2112264" indent="-164592" algn="l" defTabSz="914400" rtl="0" eaLnBrk="1" latinLnBrk="0" hangingPunct="1">
+              <a:lnSpc>
+                <a:spcPct val="90000"/>
+              </a:lnSpc>
+              <a:spcBef>
+                <a:spcPts val="0"/>
+              </a:spcBef>
+              <a:spcAft>
+                <a:spcPts val="800"/>
+              </a:spcAft>
+              <a:buClr>
+                <a:schemeClr val="accent1"/>
+              </a:buClr>
+              <a:buSzPct val="80000"/>
+              <a:buFont typeface="Wingdings" panose="05000000000000000000" pitchFamily="2" charset="2"/>
+              <a:buChar char="§"/>
+              <a:defRPr lang="en-US" sz="1800" kern="1200">
+                <a:solidFill>
+                  <a:schemeClr val="tx2"/>
+                </a:solidFill>
+                <a:latin typeface="+mn-lt"/>
+                <a:ea typeface="+mn-ea"/>
+                <a:cs typeface="+mn-cs"/>
+              </a:defRPr>
+            </a:lvl8pPr>
+            <a:lvl9pPr marL="2340864" indent="-164592" algn="l" defTabSz="914400" rtl="0" eaLnBrk="1" latinLnBrk="0" hangingPunct="1">
+              <a:lnSpc>
+                <a:spcPct val="90000"/>
+              </a:lnSpc>
+              <a:spcBef>
+                <a:spcPts val="0"/>
+              </a:spcBef>
+              <a:spcAft>
+                <a:spcPts val="800"/>
+              </a:spcAft>
+              <a:buClr>
+                <a:schemeClr val="accent1"/>
+              </a:buClr>
+              <a:buSzPct val="80000"/>
+              <a:buFont typeface="Calibri" panose="020F0502020204030204" pitchFamily="34" charset="0"/>
+              <a:buChar char="–"/>
+              <a:defRPr lang="en-US" sz="1800" kern="1200">
+                <a:solidFill>
+                  <a:schemeClr val="tx2"/>
+                </a:solidFill>
+                <a:latin typeface="+mn-lt"/>
+                <a:ea typeface="+mn-ea"/>
+                <a:cs typeface="+mn-cs"/>
+              </a:defRPr>
+            </a:lvl9pPr>
+          </a:lstStyle>
+          <a:p>
+            <a:pPr>
+              <a:lnSpc>
+                <a:spcPct val="100000"/>
+              </a:lnSpc>
+              <a:spcAft>
+                <a:spcPts val="0"/>
+              </a:spcAft>
+            </a:pPr>
+            <a:r>
+              <a:rPr lang="en-US" sz="1600" b="1">
+                <a:solidFill>
+                  <a:schemeClr val="tx2"/>
+                </a:solidFill>
+              </a:rPr>
+              <a:t>Signal conditioning</a:t>
+            </a:r>
+          </a:p>
+          <a:p>
+            <a:pPr>
+              <a:lnSpc>
+                <a:spcPct val="100000"/>
+              </a:lnSpc>
+              <a:spcAft>
+                <a:spcPts val="0"/>
+              </a:spcAft>
+            </a:pPr>
+            <a:r>
+              <a:rPr lang="en-US" sz="1600">
+                <a:solidFill>
+                  <a:schemeClr val="tx2"/>
+                </a:solidFill>
+              </a:rPr>
+              <a:t>Filters</a:t>
+            </a:r>
+          </a:p>
+          <a:p>
+            <a:pPr>
+              <a:lnSpc>
+                <a:spcPct val="100000"/>
+              </a:lnSpc>
+              <a:spcAft>
+                <a:spcPts val="0"/>
+              </a:spcAft>
+            </a:pPr>
+            <a:r>
+              <a:rPr lang="en-US" sz="1600">
+                <a:solidFill>
+                  <a:schemeClr val="tx2"/>
+                </a:solidFill>
+              </a:rPr>
+              <a:t>Echo, noise canceller</a:t>
+            </a:r>
+          </a:p>
+          <a:p>
+            <a:pPr>
+              <a:lnSpc>
+                <a:spcPct val="100000"/>
+              </a:lnSpc>
+              <a:spcAft>
+                <a:spcPts val="0"/>
+              </a:spcAft>
+            </a:pPr>
+            <a:r>
+              <a:rPr lang="en-US" sz="1600">
+                <a:solidFill>
+                  <a:schemeClr val="tx2"/>
+                </a:solidFill>
+              </a:rPr>
+              <a:t>White balance</a:t>
+            </a:r>
+          </a:p>
+        </p:txBody>
+      </p:sp>
+      <p:sp>
+        <p:nvSpPr>
+          <p:cNvPr id="10" name="Content Placeholder 3">
+            <a:extLst>
+              <a:ext uri="{FF2B5EF4-FFF2-40B4-BE49-F238E27FC236}">
+                <a16:creationId xmlns:a16="http://schemas.microsoft.com/office/drawing/2014/main" id="{BA57D39C-D722-111B-D92F-4B1F8E333E2E}"/>
+              </a:ext>
+            </a:extLst>
+          </p:cNvPr>
+          <p:cNvSpPr txBox="1">
+            <a:spLocks/>
+          </p:cNvSpPr>
+          <p:nvPr/>
+        </p:nvSpPr>
+        <p:spPr bwMode="auto">
+          <a:xfrm>
+            <a:off x="4943317" y="4052236"/>
+            <a:ext cx="1655509" cy="1025898"/>
+          </a:xfrm>
+          <a:prstGeom prst="rect">
+            <a:avLst/>
+          </a:prstGeom>
+          <a:effectLst/>
+        </p:spPr>
+        <p:txBody>
+          <a:bodyPr vert="horz" wrap="square" lIns="0" tIns="0" rIns="0" bIns="0" numCol="1" rtlCol="0" anchor="t" anchorCtr="0" compatLnSpc="1">
+            <a:prstTxWarp prst="textNoShape">
+              <a:avLst/>
+            </a:prstTxWarp>
+            <a:noAutofit/>
+          </a:bodyPr>
+          <a:lstStyle>
+            <a:lvl1pPr marL="0" indent="0" algn="l" rtl="0" eaLnBrk="1" fontAlgn="base" hangingPunct="1">
+              <a:lnSpc>
+                <a:spcPct val="90000"/>
+              </a:lnSpc>
+              <a:spcBef>
+                <a:spcPct val="0"/>
+              </a:spcBef>
+              <a:spcAft>
+                <a:spcPts val="1600"/>
+              </a:spcAft>
+              <a:buFont typeface="Calibri" charset="0"/>
+              <a:buNone/>
+              <a:defRPr sz="2400" kern="1200">
+                <a:solidFill>
+                  <a:srgbClr val="7B7F9C"/>
+                </a:solidFill>
+                <a:effectLst/>
+                <a:latin typeface="+mn-lt"/>
+                <a:ea typeface="ＭＳ Ｐゴシック" charset="0"/>
+                <a:cs typeface="ＭＳ Ｐゴシック" charset="0"/>
+              </a:defRPr>
+            </a:lvl1pPr>
+            <a:lvl2pPr marL="398463" indent="-166688" algn="l" rtl="0" eaLnBrk="1" fontAlgn="base" hangingPunct="1">
+              <a:lnSpc>
+                <a:spcPct val="90000"/>
+              </a:lnSpc>
+              <a:spcBef>
+                <a:spcPct val="0"/>
+              </a:spcBef>
+              <a:spcAft>
+                <a:spcPts val="1200"/>
+              </a:spcAft>
+              <a:buClr>
+                <a:schemeClr val="accent1"/>
+              </a:buClr>
+              <a:buSzPct val="80000"/>
+              <a:buFont typeface="Arial" charset="0"/>
+              <a:buChar char="•"/>
+              <a:defRPr sz="1400" kern="1200">
+                <a:solidFill>
+                  <a:srgbClr val="7B7F9C"/>
+                </a:solidFill>
+                <a:effectLst/>
+                <a:latin typeface="+mn-lt"/>
+                <a:ea typeface="ＭＳ Ｐゴシック" charset="0"/>
+                <a:cs typeface="+mn-cs"/>
+              </a:defRPr>
+            </a:lvl2pPr>
+            <a:lvl3pPr marL="855663" indent="-166688" algn="l" rtl="0" eaLnBrk="1" fontAlgn="base" hangingPunct="1">
+              <a:lnSpc>
+                <a:spcPct val="90000"/>
+              </a:lnSpc>
+              <a:spcBef>
+                <a:spcPct val="0"/>
+              </a:spcBef>
+              <a:spcAft>
+                <a:spcPts val="1200"/>
+              </a:spcAft>
+              <a:buClr>
+                <a:schemeClr val="accent1"/>
+              </a:buClr>
+              <a:buSzPct val="80000"/>
+              <a:buFont typeface="Calibri" charset="0"/>
+              <a:buChar char="–"/>
+              <a:defRPr sz="1400" kern="1200">
+                <a:solidFill>
+                  <a:srgbClr val="7B7F9C"/>
+                </a:solidFill>
+                <a:effectLst/>
+                <a:latin typeface="+mn-lt"/>
+                <a:ea typeface="ＭＳ Ｐゴシック" charset="0"/>
+                <a:cs typeface="+mn-cs"/>
+              </a:defRPr>
+            </a:lvl3pPr>
+            <a:lvl4pPr marL="1201738" indent="-173038" algn="l" rtl="0" eaLnBrk="1" fontAlgn="base" hangingPunct="1">
+              <a:lnSpc>
+                <a:spcPct val="90000"/>
+              </a:lnSpc>
+              <a:spcBef>
+                <a:spcPct val="0"/>
+              </a:spcBef>
+              <a:spcAft>
+                <a:spcPts val="800"/>
+              </a:spcAft>
+              <a:buClr>
+                <a:schemeClr val="accent1"/>
+              </a:buClr>
+              <a:buSzPct val="80000"/>
+              <a:buFont typeface="Wingdings" charset="2"/>
+              <a:buChar char="§"/>
+              <a:defRPr sz="1400" kern="1200">
+                <a:solidFill>
+                  <a:srgbClr val="7B7F9C"/>
+                </a:solidFill>
+                <a:effectLst/>
+                <a:latin typeface="+mn-lt"/>
+                <a:ea typeface="ＭＳ Ｐゴシック" charset="0"/>
+                <a:cs typeface="+mn-cs"/>
+              </a:defRPr>
+            </a:lvl4pPr>
+            <a:lvl5pPr marL="1427163" indent="-168275" algn="l" rtl="0" eaLnBrk="1" fontAlgn="base" hangingPunct="1">
+              <a:lnSpc>
+                <a:spcPct val="90000"/>
+              </a:lnSpc>
+              <a:spcBef>
+                <a:spcPct val="0"/>
+              </a:spcBef>
+              <a:spcAft>
+                <a:spcPts val="800"/>
+              </a:spcAft>
+              <a:buClr>
+                <a:schemeClr val="accent1"/>
+              </a:buClr>
+              <a:buSzPct val="80000"/>
+              <a:buFont typeface="Calibri" charset="0"/>
+              <a:buChar char="–"/>
+              <a:defRPr sz="1400" kern="1200">
+                <a:solidFill>
+                  <a:srgbClr val="7B7F9C"/>
+                </a:solidFill>
+                <a:effectLst/>
+                <a:latin typeface="+mn-lt"/>
+                <a:ea typeface="ＭＳ Ｐゴシック" charset="0"/>
+                <a:cs typeface="+mn-cs"/>
+              </a:defRPr>
+            </a:lvl5pPr>
+            <a:lvl6pPr marL="1655064" indent="-164592" algn="l" defTabSz="914400" rtl="0" eaLnBrk="1" latinLnBrk="0" hangingPunct="1">
+              <a:lnSpc>
+                <a:spcPct val="90000"/>
+              </a:lnSpc>
+              <a:spcBef>
+                <a:spcPts val="0"/>
+              </a:spcBef>
+              <a:spcAft>
+                <a:spcPts val="800"/>
+              </a:spcAft>
+              <a:buClr>
+                <a:schemeClr val="accent1"/>
+              </a:buClr>
+              <a:buSzPct val="80000"/>
+              <a:buFont typeface="Wingdings" panose="05000000000000000000" pitchFamily="2" charset="2"/>
+              <a:buChar char="§"/>
+              <a:defRPr lang="en-US" sz="1800" kern="1200">
+                <a:solidFill>
+                  <a:schemeClr val="tx2"/>
+                </a:solidFill>
+                <a:latin typeface="+mn-lt"/>
+                <a:ea typeface="+mn-ea"/>
+                <a:cs typeface="+mn-cs"/>
+              </a:defRPr>
+            </a:lvl6pPr>
+            <a:lvl7pPr marL="1883664" indent="-164592" algn="l" defTabSz="914400" rtl="0" eaLnBrk="1" latinLnBrk="0" hangingPunct="1">
+              <a:lnSpc>
+                <a:spcPct val="90000"/>
+              </a:lnSpc>
+              <a:spcBef>
+                <a:spcPts val="0"/>
+              </a:spcBef>
+              <a:spcAft>
+                <a:spcPts val="800"/>
+              </a:spcAft>
+              <a:buClr>
+                <a:schemeClr val="accent1"/>
+              </a:buClr>
+              <a:buSzPct val="80000"/>
+              <a:buFont typeface="Calibri" panose="020F0502020204030204" pitchFamily="34" charset="0"/>
+              <a:buChar char="–"/>
+              <a:defRPr lang="en-US" sz="1800" kern="1200">
+                <a:solidFill>
+                  <a:schemeClr val="tx2"/>
+                </a:solidFill>
+                <a:latin typeface="+mn-lt"/>
+                <a:ea typeface="+mn-ea"/>
+                <a:cs typeface="+mn-cs"/>
+              </a:defRPr>
+            </a:lvl7pPr>
+            <a:lvl8pPr marL="2112264" indent="-164592" algn="l" defTabSz="914400" rtl="0" eaLnBrk="1" latinLnBrk="0" hangingPunct="1">
+              <a:lnSpc>
+                <a:spcPct val="90000"/>
+              </a:lnSpc>
+              <a:spcBef>
+                <a:spcPts val="0"/>
+              </a:spcBef>
+              <a:spcAft>
+                <a:spcPts val="800"/>
+              </a:spcAft>
+              <a:buClr>
+                <a:schemeClr val="accent1"/>
+              </a:buClr>
+              <a:buSzPct val="80000"/>
+              <a:buFont typeface="Wingdings" panose="05000000000000000000" pitchFamily="2" charset="2"/>
+              <a:buChar char="§"/>
+              <a:defRPr lang="en-US" sz="1800" kern="1200">
+                <a:solidFill>
+                  <a:schemeClr val="tx2"/>
+                </a:solidFill>
+                <a:latin typeface="+mn-lt"/>
+                <a:ea typeface="+mn-ea"/>
+                <a:cs typeface="+mn-cs"/>
+              </a:defRPr>
+            </a:lvl8pPr>
+            <a:lvl9pPr marL="2340864" indent="-164592" algn="l" defTabSz="914400" rtl="0" eaLnBrk="1" latinLnBrk="0" hangingPunct="1">
+              <a:lnSpc>
+                <a:spcPct val="90000"/>
+              </a:lnSpc>
+              <a:spcBef>
+                <a:spcPts val="0"/>
+              </a:spcBef>
+              <a:spcAft>
+                <a:spcPts val="800"/>
+              </a:spcAft>
+              <a:buClr>
+                <a:schemeClr val="accent1"/>
+              </a:buClr>
+              <a:buSzPct val="80000"/>
+              <a:buFont typeface="Calibri" panose="020F0502020204030204" pitchFamily="34" charset="0"/>
+              <a:buChar char="–"/>
+              <a:defRPr lang="en-US" sz="1800" kern="1200">
+                <a:solidFill>
+                  <a:schemeClr val="tx2"/>
+                </a:solidFill>
+                <a:latin typeface="+mn-lt"/>
+                <a:ea typeface="+mn-ea"/>
+                <a:cs typeface="+mn-cs"/>
+              </a:defRPr>
+            </a:lvl9pPr>
+          </a:lstStyle>
+          <a:p>
+            <a:pPr>
+              <a:lnSpc>
+                <a:spcPct val="100000"/>
+              </a:lnSpc>
+              <a:spcAft>
+                <a:spcPts val="0"/>
+              </a:spcAft>
+            </a:pPr>
+            <a:r>
+              <a:rPr lang="en-US" sz="1600" b="1">
+                <a:solidFill>
+                  <a:schemeClr val="tx2"/>
+                </a:solidFill>
+              </a:rPr>
+              <a:t>Feature extraction</a:t>
+            </a:r>
+          </a:p>
+          <a:p>
+            <a:pPr>
+              <a:lnSpc>
+                <a:spcPct val="100000"/>
+              </a:lnSpc>
+              <a:spcAft>
+                <a:spcPts val="0"/>
+              </a:spcAft>
+            </a:pPr>
+            <a:r>
+              <a:rPr lang="en-US" sz="1600">
+                <a:solidFill>
+                  <a:schemeClr val="tx2"/>
+                </a:solidFill>
+              </a:rPr>
+              <a:t>Spectral data</a:t>
+            </a:r>
+          </a:p>
+          <a:p>
+            <a:pPr>
+              <a:lnSpc>
+                <a:spcPct val="100000"/>
+              </a:lnSpc>
+              <a:spcAft>
+                <a:spcPts val="0"/>
+              </a:spcAft>
+            </a:pPr>
+            <a:r>
+              <a:rPr lang="en-US" sz="1600">
+                <a:solidFill>
+                  <a:schemeClr val="tx2"/>
+                </a:solidFill>
+              </a:rPr>
+              <a:t>MFCC (audio)</a:t>
+            </a:r>
+          </a:p>
+          <a:p>
+            <a:pPr>
+              <a:lnSpc>
+                <a:spcPct val="100000"/>
+              </a:lnSpc>
+              <a:spcAft>
+                <a:spcPts val="0"/>
+              </a:spcAft>
+            </a:pPr>
+            <a:r>
+              <a:rPr lang="en-US" sz="1600">
+                <a:solidFill>
+                  <a:schemeClr val="tx2"/>
+                </a:solidFill>
+              </a:rPr>
+              <a:t>Convolution (pixel)</a:t>
+            </a:r>
+          </a:p>
+        </p:txBody>
+      </p:sp>
+      <p:sp>
+        <p:nvSpPr>
+          <p:cNvPr id="11" name="Content Placeholder 3">
+            <a:extLst>
+              <a:ext uri="{FF2B5EF4-FFF2-40B4-BE49-F238E27FC236}">
+                <a16:creationId xmlns:a16="http://schemas.microsoft.com/office/drawing/2014/main" id="{F693053D-8950-6687-FCB1-43188291964C}"/>
+              </a:ext>
+            </a:extLst>
+          </p:cNvPr>
+          <p:cNvSpPr txBox="1">
+            <a:spLocks/>
+          </p:cNvSpPr>
+          <p:nvPr/>
+        </p:nvSpPr>
+        <p:spPr bwMode="auto">
+          <a:xfrm>
+            <a:off x="7426382" y="4091981"/>
+            <a:ext cx="2057144" cy="1037984"/>
+          </a:xfrm>
+          <a:prstGeom prst="rect">
+            <a:avLst/>
+          </a:prstGeom>
+          <a:effectLst/>
+        </p:spPr>
+        <p:txBody>
+          <a:bodyPr vert="horz" wrap="square" lIns="0" tIns="0" rIns="0" bIns="0" numCol="1" rtlCol="0" anchor="t" anchorCtr="0" compatLnSpc="1">
+            <a:prstTxWarp prst="textNoShape">
+              <a:avLst/>
+            </a:prstTxWarp>
+            <a:noAutofit/>
+          </a:bodyPr>
+          <a:lstStyle>
+            <a:lvl1pPr marL="0" indent="0" algn="l" rtl="0" eaLnBrk="1" fontAlgn="base" hangingPunct="1">
+              <a:lnSpc>
+                <a:spcPct val="90000"/>
+              </a:lnSpc>
+              <a:spcBef>
+                <a:spcPct val="0"/>
+              </a:spcBef>
+              <a:spcAft>
+                <a:spcPts val="1600"/>
+              </a:spcAft>
+              <a:buFont typeface="Calibri" charset="0"/>
+              <a:buNone/>
+              <a:defRPr sz="2400" kern="1200">
+                <a:solidFill>
+                  <a:srgbClr val="7B7F9C"/>
+                </a:solidFill>
+                <a:effectLst/>
+                <a:latin typeface="+mn-lt"/>
+                <a:ea typeface="ＭＳ Ｐゴシック" charset="0"/>
+                <a:cs typeface="ＭＳ Ｐゴシック" charset="0"/>
+              </a:defRPr>
+            </a:lvl1pPr>
+            <a:lvl2pPr marL="398463" indent="-166688" algn="l" rtl="0" eaLnBrk="1" fontAlgn="base" hangingPunct="1">
+              <a:lnSpc>
+                <a:spcPct val="90000"/>
+              </a:lnSpc>
+              <a:spcBef>
+                <a:spcPct val="0"/>
+              </a:spcBef>
+              <a:spcAft>
+                <a:spcPts val="1200"/>
+              </a:spcAft>
+              <a:buClr>
+                <a:schemeClr val="accent1"/>
+              </a:buClr>
+              <a:buSzPct val="80000"/>
+              <a:buFont typeface="Arial" charset="0"/>
+              <a:buChar char="•"/>
+              <a:defRPr sz="1400" kern="1200">
+                <a:solidFill>
+                  <a:srgbClr val="7B7F9C"/>
+                </a:solidFill>
+                <a:effectLst/>
+                <a:latin typeface="+mn-lt"/>
+                <a:ea typeface="ＭＳ Ｐゴシック" charset="0"/>
+                <a:cs typeface="+mn-cs"/>
+              </a:defRPr>
+            </a:lvl2pPr>
+            <a:lvl3pPr marL="855663" indent="-166688" algn="l" rtl="0" eaLnBrk="1" fontAlgn="base" hangingPunct="1">
+              <a:lnSpc>
+                <a:spcPct val="90000"/>
+              </a:lnSpc>
+              <a:spcBef>
+                <a:spcPct val="0"/>
+              </a:spcBef>
+              <a:spcAft>
+                <a:spcPts val="1200"/>
+              </a:spcAft>
+              <a:buClr>
+                <a:schemeClr val="accent1"/>
+              </a:buClr>
+              <a:buSzPct val="80000"/>
+              <a:buFont typeface="Calibri" charset="0"/>
+              <a:buChar char="–"/>
+              <a:defRPr sz="1400" kern="1200">
+                <a:solidFill>
+                  <a:srgbClr val="7B7F9C"/>
+                </a:solidFill>
+                <a:effectLst/>
+                <a:latin typeface="+mn-lt"/>
+                <a:ea typeface="ＭＳ Ｐゴシック" charset="0"/>
+                <a:cs typeface="+mn-cs"/>
+              </a:defRPr>
+            </a:lvl3pPr>
+            <a:lvl4pPr marL="1201738" indent="-173038" algn="l" rtl="0" eaLnBrk="1" fontAlgn="base" hangingPunct="1">
+              <a:lnSpc>
+                <a:spcPct val="90000"/>
+              </a:lnSpc>
+              <a:spcBef>
+                <a:spcPct val="0"/>
+              </a:spcBef>
+              <a:spcAft>
+                <a:spcPts val="800"/>
+              </a:spcAft>
+              <a:buClr>
+                <a:schemeClr val="accent1"/>
+              </a:buClr>
+              <a:buSzPct val="80000"/>
+              <a:buFont typeface="Wingdings" charset="2"/>
+              <a:buChar char="§"/>
+              <a:defRPr sz="1400" kern="1200">
+                <a:solidFill>
+                  <a:srgbClr val="7B7F9C"/>
+                </a:solidFill>
+                <a:effectLst/>
+                <a:latin typeface="+mn-lt"/>
+                <a:ea typeface="ＭＳ Ｐゴシック" charset="0"/>
+                <a:cs typeface="+mn-cs"/>
+              </a:defRPr>
+            </a:lvl4pPr>
+            <a:lvl5pPr marL="1427163" indent="-168275" algn="l" rtl="0" eaLnBrk="1" fontAlgn="base" hangingPunct="1">
+              <a:lnSpc>
+                <a:spcPct val="90000"/>
+              </a:lnSpc>
+              <a:spcBef>
+                <a:spcPct val="0"/>
+              </a:spcBef>
+              <a:spcAft>
+                <a:spcPts val="800"/>
+              </a:spcAft>
+              <a:buClr>
+                <a:schemeClr val="accent1"/>
+              </a:buClr>
+              <a:buSzPct val="80000"/>
+              <a:buFont typeface="Calibri" charset="0"/>
+              <a:buChar char="–"/>
+              <a:defRPr sz="1400" kern="1200">
+                <a:solidFill>
+                  <a:srgbClr val="7B7F9C"/>
+                </a:solidFill>
+                <a:effectLst/>
+                <a:latin typeface="+mn-lt"/>
+                <a:ea typeface="ＭＳ Ｐゴシック" charset="0"/>
+                <a:cs typeface="+mn-cs"/>
+              </a:defRPr>
+            </a:lvl5pPr>
+            <a:lvl6pPr marL="1655064" indent="-164592" algn="l" defTabSz="914400" rtl="0" eaLnBrk="1" latinLnBrk="0" hangingPunct="1">
+              <a:lnSpc>
+                <a:spcPct val="90000"/>
+              </a:lnSpc>
+              <a:spcBef>
+                <a:spcPts val="0"/>
+              </a:spcBef>
+              <a:spcAft>
+                <a:spcPts val="800"/>
+              </a:spcAft>
+              <a:buClr>
+                <a:schemeClr val="accent1"/>
+              </a:buClr>
+              <a:buSzPct val="80000"/>
+              <a:buFont typeface="Wingdings" panose="05000000000000000000" pitchFamily="2" charset="2"/>
+              <a:buChar char="§"/>
+              <a:defRPr lang="en-US" sz="1800" kern="1200">
+                <a:solidFill>
+                  <a:schemeClr val="tx2"/>
+                </a:solidFill>
+                <a:latin typeface="+mn-lt"/>
+                <a:ea typeface="+mn-ea"/>
+                <a:cs typeface="+mn-cs"/>
+              </a:defRPr>
+            </a:lvl6pPr>
+            <a:lvl7pPr marL="1883664" indent="-164592" algn="l" defTabSz="914400" rtl="0" eaLnBrk="1" latinLnBrk="0" hangingPunct="1">
+              <a:lnSpc>
+                <a:spcPct val="90000"/>
+              </a:lnSpc>
+              <a:spcBef>
+                <a:spcPts val="0"/>
+              </a:spcBef>
+              <a:spcAft>
+                <a:spcPts val="800"/>
+              </a:spcAft>
+              <a:buClr>
+                <a:schemeClr val="accent1"/>
+              </a:buClr>
+              <a:buSzPct val="80000"/>
+              <a:buFont typeface="Calibri" panose="020F0502020204030204" pitchFamily="34" charset="0"/>
+              <a:buChar char="–"/>
+              <a:defRPr lang="en-US" sz="1800" kern="1200">
+                <a:solidFill>
+                  <a:schemeClr val="tx2"/>
+                </a:solidFill>
+                <a:latin typeface="+mn-lt"/>
+                <a:ea typeface="+mn-ea"/>
+                <a:cs typeface="+mn-cs"/>
+              </a:defRPr>
+            </a:lvl7pPr>
+            <a:lvl8pPr marL="2112264" indent="-164592" algn="l" defTabSz="914400" rtl="0" eaLnBrk="1" latinLnBrk="0" hangingPunct="1">
+              <a:lnSpc>
+                <a:spcPct val="90000"/>
+              </a:lnSpc>
+              <a:spcBef>
+                <a:spcPts val="0"/>
+              </a:spcBef>
+              <a:spcAft>
+                <a:spcPts val="800"/>
+              </a:spcAft>
+              <a:buClr>
+                <a:schemeClr val="accent1"/>
+              </a:buClr>
+              <a:buSzPct val="80000"/>
+              <a:buFont typeface="Wingdings" panose="05000000000000000000" pitchFamily="2" charset="2"/>
+              <a:buChar char="§"/>
+              <a:defRPr lang="en-US" sz="1800" kern="1200">
+                <a:solidFill>
+                  <a:schemeClr val="tx2"/>
+                </a:solidFill>
+                <a:latin typeface="+mn-lt"/>
+                <a:ea typeface="+mn-ea"/>
+                <a:cs typeface="+mn-cs"/>
+              </a:defRPr>
+            </a:lvl8pPr>
+            <a:lvl9pPr marL="2340864" indent="-164592" algn="l" defTabSz="914400" rtl="0" eaLnBrk="1" latinLnBrk="0" hangingPunct="1">
+              <a:lnSpc>
+                <a:spcPct val="90000"/>
+              </a:lnSpc>
+              <a:spcBef>
+                <a:spcPts val="0"/>
+              </a:spcBef>
+              <a:spcAft>
+                <a:spcPts val="800"/>
+              </a:spcAft>
+              <a:buClr>
+                <a:schemeClr val="accent1"/>
+              </a:buClr>
+              <a:buSzPct val="80000"/>
+              <a:buFont typeface="Calibri" panose="020F0502020204030204" pitchFamily="34" charset="0"/>
+              <a:buChar char="–"/>
+              <a:defRPr lang="en-US" sz="1800" kern="1200">
+                <a:solidFill>
+                  <a:schemeClr val="tx2"/>
+                </a:solidFill>
+                <a:latin typeface="+mn-lt"/>
+                <a:ea typeface="+mn-ea"/>
+                <a:cs typeface="+mn-cs"/>
+              </a:defRPr>
+            </a:lvl9pPr>
+          </a:lstStyle>
+          <a:p>
+            <a:pPr>
+              <a:spcAft>
+                <a:spcPts val="600"/>
+              </a:spcAft>
+            </a:pPr>
+            <a:r>
+              <a:rPr lang="en-US" sz="1600" b="1">
+                <a:solidFill>
+                  <a:schemeClr val="tx2"/>
+                </a:solidFill>
+              </a:rPr>
+              <a:t>Classifier</a:t>
+            </a:r>
+          </a:p>
+          <a:p>
+            <a:pPr>
+              <a:spcAft>
+                <a:spcPts val="600"/>
+              </a:spcAft>
+            </a:pPr>
+            <a:r>
+              <a:rPr lang="en-US" sz="1600">
+                <a:solidFill>
+                  <a:schemeClr val="tx2"/>
+                </a:solidFill>
+              </a:rPr>
+              <a:t>Classical ML</a:t>
+            </a:r>
+            <a:br>
+              <a:rPr lang="en-US" sz="1600">
+                <a:solidFill>
+                  <a:schemeClr val="tx2"/>
+                </a:solidFill>
+              </a:rPr>
+            </a:br>
+            <a:r>
+              <a:rPr lang="en-US" sz="1600">
+                <a:solidFill>
+                  <a:schemeClr val="tx2"/>
+                </a:solidFill>
+              </a:rPr>
+              <a:t>Deep learning (NN)</a:t>
+            </a:r>
+          </a:p>
+        </p:txBody>
+      </p:sp>
+      <p:grpSp>
+        <p:nvGrpSpPr>
+          <p:cNvPr id="12" name="Group 11">
+            <a:extLst>
+              <a:ext uri="{FF2B5EF4-FFF2-40B4-BE49-F238E27FC236}">
+                <a16:creationId xmlns:a16="http://schemas.microsoft.com/office/drawing/2014/main" id="{49F516C4-E6F7-F722-A287-4039F5FCE00E}"/>
+              </a:ext>
+            </a:extLst>
+          </p:cNvPr>
+          <p:cNvGrpSpPr/>
+          <p:nvPr/>
+        </p:nvGrpSpPr>
+        <p:grpSpPr>
+          <a:xfrm>
+            <a:off x="2111505" y="3902044"/>
+            <a:ext cx="2079242" cy="1227921"/>
+            <a:chOff x="2775118" y="3738777"/>
+            <a:chExt cx="1831547" cy="1424033"/>
+          </a:xfrm>
+        </p:grpSpPr>
+        <p:sp>
+          <p:nvSpPr>
+            <p:cNvPr id="25" name="Freeform 7">
+              <a:extLst>
+                <a:ext uri="{FF2B5EF4-FFF2-40B4-BE49-F238E27FC236}">
+                  <a16:creationId xmlns:a16="http://schemas.microsoft.com/office/drawing/2014/main" id="{64A148EA-C49C-EA56-2201-8A38C285080C}"/>
+                </a:ext>
+              </a:extLst>
+            </p:cNvPr>
+            <p:cNvSpPr/>
+            <p:nvPr/>
+          </p:nvSpPr>
+          <p:spPr>
+            <a:xfrm>
+              <a:off x="2830671" y="3795105"/>
+              <a:ext cx="1775994" cy="1367705"/>
+            </a:xfrm>
+            <a:custGeom>
+              <a:avLst/>
+              <a:gdLst>
+                <a:gd name="connsiteX0" fmla="*/ 178326 w 1430409"/>
+                <a:gd name="connsiteY0" fmla="*/ 0 h 717102"/>
+                <a:gd name="connsiteX1" fmla="*/ 1430409 w 1430409"/>
+                <a:gd name="connsiteY1" fmla="*/ 0 h 717102"/>
+                <a:gd name="connsiteX2" fmla="*/ 1430409 w 1430409"/>
+                <a:gd name="connsiteY2" fmla="*/ 717102 h 717102"/>
+                <a:gd name="connsiteX3" fmla="*/ 0 w 1430409"/>
+                <a:gd name="connsiteY3" fmla="*/ 717102 h 717102"/>
+                <a:gd name="connsiteX4" fmla="*/ 0 w 1430409"/>
+                <a:gd name="connsiteY4" fmla="*/ 178327 h 717102"/>
+                <a:gd name="connsiteX0" fmla="*/ 127526 w 1430409"/>
+                <a:gd name="connsiteY0" fmla="*/ 0 h 717102"/>
+                <a:gd name="connsiteX1" fmla="*/ 1430409 w 1430409"/>
+                <a:gd name="connsiteY1" fmla="*/ 0 h 717102"/>
+                <a:gd name="connsiteX2" fmla="*/ 1430409 w 1430409"/>
+                <a:gd name="connsiteY2" fmla="*/ 717102 h 717102"/>
+                <a:gd name="connsiteX3" fmla="*/ 0 w 1430409"/>
+                <a:gd name="connsiteY3" fmla="*/ 717102 h 717102"/>
+                <a:gd name="connsiteX4" fmla="*/ 0 w 1430409"/>
+                <a:gd name="connsiteY4" fmla="*/ 178327 h 717102"/>
+                <a:gd name="connsiteX0" fmla="*/ 127526 w 1430409"/>
+                <a:gd name="connsiteY0" fmla="*/ 0 h 717102"/>
+                <a:gd name="connsiteX1" fmla="*/ 1430409 w 1430409"/>
+                <a:gd name="connsiteY1" fmla="*/ 0 h 717102"/>
+                <a:gd name="connsiteX2" fmla="*/ 1430409 w 1430409"/>
+                <a:gd name="connsiteY2" fmla="*/ 717102 h 717102"/>
+                <a:gd name="connsiteX3" fmla="*/ 0 w 1430409"/>
+                <a:gd name="connsiteY3" fmla="*/ 717102 h 717102"/>
+                <a:gd name="connsiteX4" fmla="*/ 0 w 1430409"/>
+                <a:gd name="connsiteY4" fmla="*/ 127527 h 717102"/>
+                <a:gd name="connsiteX0" fmla="*/ 127526 w 1430409"/>
+                <a:gd name="connsiteY0" fmla="*/ 0 h 717102"/>
+                <a:gd name="connsiteX1" fmla="*/ 1430409 w 1430409"/>
+                <a:gd name="connsiteY1" fmla="*/ 0 h 717102"/>
+                <a:gd name="connsiteX2" fmla="*/ 1430409 w 1430409"/>
+                <a:gd name="connsiteY2" fmla="*/ 717102 h 717102"/>
+                <a:gd name="connsiteX3" fmla="*/ 0 w 1430409"/>
+                <a:gd name="connsiteY3" fmla="*/ 717102 h 717102"/>
+                <a:gd name="connsiteX4" fmla="*/ 0 w 1430409"/>
+                <a:gd name="connsiteY4" fmla="*/ 168348 h 717102"/>
+                <a:gd name="connsiteX0" fmla="*/ 127526 w 1430409"/>
+                <a:gd name="connsiteY0" fmla="*/ 0 h 717102"/>
+                <a:gd name="connsiteX1" fmla="*/ 1430409 w 1430409"/>
+                <a:gd name="connsiteY1" fmla="*/ 0 h 717102"/>
+                <a:gd name="connsiteX2" fmla="*/ 1430409 w 1430409"/>
+                <a:gd name="connsiteY2" fmla="*/ 717102 h 717102"/>
+                <a:gd name="connsiteX3" fmla="*/ 0 w 1430409"/>
+                <a:gd name="connsiteY3" fmla="*/ 717102 h 717102"/>
+                <a:gd name="connsiteX4" fmla="*/ 0 w 1430409"/>
+                <a:gd name="connsiteY4" fmla="*/ 120259 h 717102"/>
+                <a:gd name="connsiteX0" fmla="*/ 127526 w 1430409"/>
+                <a:gd name="connsiteY0" fmla="*/ 0 h 717102"/>
+                <a:gd name="connsiteX1" fmla="*/ 1430409 w 1430409"/>
+                <a:gd name="connsiteY1" fmla="*/ 0 h 717102"/>
+                <a:gd name="connsiteX2" fmla="*/ 1430409 w 1430409"/>
+                <a:gd name="connsiteY2" fmla="*/ 717102 h 717102"/>
+                <a:gd name="connsiteX3" fmla="*/ 0 w 1430409"/>
+                <a:gd name="connsiteY3" fmla="*/ 717102 h 717102"/>
+                <a:gd name="connsiteX4" fmla="*/ 0 w 1430409"/>
+                <a:gd name="connsiteY4" fmla="*/ 142700 h 717102"/>
+                <a:gd name="connsiteX0" fmla="*/ 127526 w 1430409"/>
+                <a:gd name="connsiteY0" fmla="*/ 0 h 717102"/>
+                <a:gd name="connsiteX1" fmla="*/ 1430409 w 1430409"/>
+                <a:gd name="connsiteY1" fmla="*/ 0 h 717102"/>
+                <a:gd name="connsiteX2" fmla="*/ 1430409 w 1430409"/>
+                <a:gd name="connsiteY2" fmla="*/ 717102 h 717102"/>
+                <a:gd name="connsiteX3" fmla="*/ 0 w 1430409"/>
+                <a:gd name="connsiteY3" fmla="*/ 717102 h 717102"/>
+                <a:gd name="connsiteX4" fmla="*/ 3329 w 1430409"/>
+                <a:gd name="connsiteY4" fmla="*/ 113541 h 717102"/>
+              </a:gdLst>
+              <a:ahLst/>
+              <a:cxnLst>
+                <a:cxn ang="0">
+                  <a:pos x="connsiteX0" y="connsiteY0"/>
+                </a:cxn>
+                <a:cxn ang="0">
+                  <a:pos x="connsiteX1" y="connsiteY1"/>
+                </a:cxn>
+                <a:cxn ang="0">
+                  <a:pos x="connsiteX2" y="connsiteY2"/>
+                </a:cxn>
+                <a:cxn ang="0">
+                  <a:pos x="connsiteX3" y="connsiteY3"/>
+                </a:cxn>
+                <a:cxn ang="0">
+                  <a:pos x="connsiteX4" y="connsiteY4"/>
+                </a:cxn>
+              </a:cxnLst>
+              <a:rect l="l" t="t" r="r" b="b"/>
+              <a:pathLst>
+                <a:path w="1430409" h="717102">
+                  <a:moveTo>
+                    <a:pt x="127526" y="0"/>
+                  </a:moveTo>
+                  <a:lnTo>
+                    <a:pt x="1430409" y="0"/>
+                  </a:lnTo>
+                  <a:lnTo>
+                    <a:pt x="1430409" y="717102"/>
+                  </a:lnTo>
+                  <a:lnTo>
+                    <a:pt x="0" y="717102"/>
+                  </a:lnTo>
+                  <a:cubicBezTo>
+                    <a:pt x="0" y="525635"/>
+                    <a:pt x="3329" y="305008"/>
+                    <a:pt x="3329" y="113541"/>
+                  </a:cubicBezTo>
+                </a:path>
+              </a:pathLst>
+            </a:custGeom>
+            <a:noFill/>
+            <a:ln w="19050">
+              <a:solidFill>
+                <a:schemeClr val="accent4"/>
+              </a:solidFill>
+            </a:ln>
+          </p:spPr>
+          <p:style>
+            <a:lnRef idx="2">
+              <a:schemeClr val="accent1">
+                <a:shade val="50000"/>
+              </a:schemeClr>
+            </a:lnRef>
+            <a:fillRef idx="1">
+              <a:schemeClr val="accent1"/>
+            </a:fillRef>
+            <a:effectRef idx="0">
+              <a:schemeClr val="accent1"/>
+            </a:effectRef>
+            <a:fontRef idx="minor">
+              <a:schemeClr val="lt1"/>
+            </a:fontRef>
+          </p:style>
+          <p:txBody>
+            <a:bodyPr rtlCol="0" anchor="ctr"/>
+            <a:lstStyle/>
+            <a:p>
+              <a:pPr algn="ctr"/>
+              <a:endParaRPr lang="en-US">
+                <a:solidFill>
+                  <a:schemeClr val="tx2"/>
+                </a:solidFill>
+              </a:endParaRPr>
+            </a:p>
+          </p:txBody>
+        </p:sp>
+        <p:pic>
+          <p:nvPicPr>
+            <p:cNvPr id="26" name="Graphic 25">
+              <a:extLst>
+                <a:ext uri="{FF2B5EF4-FFF2-40B4-BE49-F238E27FC236}">
+                  <a16:creationId xmlns:a16="http://schemas.microsoft.com/office/drawing/2014/main" id="{A24B315B-67FB-13F8-3E20-C969C12D6972}"/>
+                </a:ext>
+              </a:extLst>
+            </p:cNvPr>
+            <p:cNvPicPr>
+              <a:picLocks noChangeAspect="1"/>
+            </p:cNvPicPr>
+            <p:nvPr/>
+          </p:nvPicPr>
+          <p:blipFill>
+            <a:blip r:embed="rId3" cstate="screen">
+              <a:extLst>
+                <a:ext uri="{28A0092B-C50C-407E-A947-70E740481C1C}">
+                  <a14:useLocalDpi xmlns:a14="http://schemas.microsoft.com/office/drawing/2010/main"/>
+                </a:ext>
+                <a:ext uri="{96DAC541-7B7A-43D3-8B79-37D633B846F1}">
+                  <asvg:svgBlip xmlns:asvg="http://schemas.microsoft.com/office/drawing/2016/SVG/main" r:embed="rId4"/>
+                </a:ext>
+              </a:extLst>
+            </a:blip>
+            <a:stretch>
+              <a:fillRect/>
+            </a:stretch>
+          </p:blipFill>
+          <p:spPr>
+            <a:xfrm>
+              <a:off x="2775118" y="3738777"/>
+              <a:ext cx="111105" cy="111105"/>
+            </a:xfrm>
+            <a:prstGeom prst="rect">
+              <a:avLst/>
+            </a:prstGeom>
+          </p:spPr>
+        </p:pic>
+      </p:grpSp>
+      <p:grpSp>
+        <p:nvGrpSpPr>
+          <p:cNvPr id="13" name="Group 12">
+            <a:extLst>
+              <a:ext uri="{FF2B5EF4-FFF2-40B4-BE49-F238E27FC236}">
+                <a16:creationId xmlns:a16="http://schemas.microsoft.com/office/drawing/2014/main" id="{1E1EF496-14DB-CD24-36EB-C60EF9AF5EC2}"/>
+              </a:ext>
+            </a:extLst>
+          </p:cNvPr>
+          <p:cNvGrpSpPr/>
+          <p:nvPr/>
+        </p:nvGrpSpPr>
+        <p:grpSpPr>
+          <a:xfrm>
+            <a:off x="7214695" y="3902044"/>
+            <a:ext cx="1854726" cy="1227922"/>
+            <a:chOff x="7823289" y="3738776"/>
+            <a:chExt cx="2167876" cy="1424033"/>
+          </a:xfrm>
+        </p:grpSpPr>
+        <p:sp>
+          <p:nvSpPr>
+            <p:cNvPr id="23" name="Freeform 11">
+              <a:extLst>
+                <a:ext uri="{FF2B5EF4-FFF2-40B4-BE49-F238E27FC236}">
+                  <a16:creationId xmlns:a16="http://schemas.microsoft.com/office/drawing/2014/main" id="{636FDA2C-8CE7-CF63-4E3F-621F8157C0CC}"/>
+                </a:ext>
+              </a:extLst>
+            </p:cNvPr>
+            <p:cNvSpPr/>
+            <p:nvPr/>
+          </p:nvSpPr>
+          <p:spPr>
+            <a:xfrm>
+              <a:off x="7874303" y="3795105"/>
+              <a:ext cx="2116862" cy="1367704"/>
+            </a:xfrm>
+            <a:custGeom>
+              <a:avLst/>
+              <a:gdLst>
+                <a:gd name="connsiteX0" fmla="*/ 178326 w 1430409"/>
+                <a:gd name="connsiteY0" fmla="*/ 0 h 717102"/>
+                <a:gd name="connsiteX1" fmla="*/ 1430409 w 1430409"/>
+                <a:gd name="connsiteY1" fmla="*/ 0 h 717102"/>
+                <a:gd name="connsiteX2" fmla="*/ 1430409 w 1430409"/>
+                <a:gd name="connsiteY2" fmla="*/ 717102 h 717102"/>
+                <a:gd name="connsiteX3" fmla="*/ 0 w 1430409"/>
+                <a:gd name="connsiteY3" fmla="*/ 717102 h 717102"/>
+                <a:gd name="connsiteX4" fmla="*/ 0 w 1430409"/>
+                <a:gd name="connsiteY4" fmla="*/ 178327 h 717102"/>
+                <a:gd name="connsiteX0" fmla="*/ 127526 w 1430409"/>
+                <a:gd name="connsiteY0" fmla="*/ 0 h 717102"/>
+                <a:gd name="connsiteX1" fmla="*/ 1430409 w 1430409"/>
+                <a:gd name="connsiteY1" fmla="*/ 0 h 717102"/>
+                <a:gd name="connsiteX2" fmla="*/ 1430409 w 1430409"/>
+                <a:gd name="connsiteY2" fmla="*/ 717102 h 717102"/>
+                <a:gd name="connsiteX3" fmla="*/ 0 w 1430409"/>
+                <a:gd name="connsiteY3" fmla="*/ 717102 h 717102"/>
+                <a:gd name="connsiteX4" fmla="*/ 0 w 1430409"/>
+                <a:gd name="connsiteY4" fmla="*/ 178327 h 717102"/>
+                <a:gd name="connsiteX0" fmla="*/ 127526 w 1430409"/>
+                <a:gd name="connsiteY0" fmla="*/ 0 h 717102"/>
+                <a:gd name="connsiteX1" fmla="*/ 1430409 w 1430409"/>
+                <a:gd name="connsiteY1" fmla="*/ 0 h 717102"/>
+                <a:gd name="connsiteX2" fmla="*/ 1430409 w 1430409"/>
+                <a:gd name="connsiteY2" fmla="*/ 717102 h 717102"/>
+                <a:gd name="connsiteX3" fmla="*/ 0 w 1430409"/>
+                <a:gd name="connsiteY3" fmla="*/ 717102 h 717102"/>
+                <a:gd name="connsiteX4" fmla="*/ 0 w 1430409"/>
+                <a:gd name="connsiteY4" fmla="*/ 127527 h 717102"/>
+                <a:gd name="connsiteX0" fmla="*/ 127526 w 1430409"/>
+                <a:gd name="connsiteY0" fmla="*/ 0 h 717102"/>
+                <a:gd name="connsiteX1" fmla="*/ 1430409 w 1430409"/>
+                <a:gd name="connsiteY1" fmla="*/ 0 h 717102"/>
+                <a:gd name="connsiteX2" fmla="*/ 1430409 w 1430409"/>
+                <a:gd name="connsiteY2" fmla="*/ 717102 h 717102"/>
+                <a:gd name="connsiteX3" fmla="*/ 0 w 1430409"/>
+                <a:gd name="connsiteY3" fmla="*/ 717102 h 717102"/>
+                <a:gd name="connsiteX4" fmla="*/ 0 w 1430409"/>
+                <a:gd name="connsiteY4" fmla="*/ 168348 h 717102"/>
+                <a:gd name="connsiteX0" fmla="*/ 127526 w 1430409"/>
+                <a:gd name="connsiteY0" fmla="*/ 0 h 717102"/>
+                <a:gd name="connsiteX1" fmla="*/ 1430409 w 1430409"/>
+                <a:gd name="connsiteY1" fmla="*/ 0 h 717102"/>
+                <a:gd name="connsiteX2" fmla="*/ 1430409 w 1430409"/>
+                <a:gd name="connsiteY2" fmla="*/ 717102 h 717102"/>
+                <a:gd name="connsiteX3" fmla="*/ 0 w 1430409"/>
+                <a:gd name="connsiteY3" fmla="*/ 717102 h 717102"/>
+                <a:gd name="connsiteX4" fmla="*/ 0 w 1430409"/>
+                <a:gd name="connsiteY4" fmla="*/ 120259 h 717102"/>
+                <a:gd name="connsiteX0" fmla="*/ 127526 w 1430409"/>
+                <a:gd name="connsiteY0" fmla="*/ 0 h 717102"/>
+                <a:gd name="connsiteX1" fmla="*/ 1430409 w 1430409"/>
+                <a:gd name="connsiteY1" fmla="*/ 0 h 717102"/>
+                <a:gd name="connsiteX2" fmla="*/ 1430409 w 1430409"/>
+                <a:gd name="connsiteY2" fmla="*/ 717102 h 717102"/>
+                <a:gd name="connsiteX3" fmla="*/ 0 w 1430409"/>
+                <a:gd name="connsiteY3" fmla="*/ 717102 h 717102"/>
+                <a:gd name="connsiteX4" fmla="*/ 0 w 1430409"/>
+                <a:gd name="connsiteY4" fmla="*/ 142700 h 717102"/>
+                <a:gd name="connsiteX0" fmla="*/ 127526 w 1430409"/>
+                <a:gd name="connsiteY0" fmla="*/ 0 h 717102"/>
+                <a:gd name="connsiteX1" fmla="*/ 1430409 w 1430409"/>
+                <a:gd name="connsiteY1" fmla="*/ 0 h 717102"/>
+                <a:gd name="connsiteX2" fmla="*/ 1430409 w 1430409"/>
+                <a:gd name="connsiteY2" fmla="*/ 717102 h 717102"/>
+                <a:gd name="connsiteX3" fmla="*/ 0 w 1430409"/>
+                <a:gd name="connsiteY3" fmla="*/ 717102 h 717102"/>
+                <a:gd name="connsiteX4" fmla="*/ 3329 w 1430409"/>
+                <a:gd name="connsiteY4" fmla="*/ 113541 h 717102"/>
+              </a:gdLst>
+              <a:ahLst/>
+              <a:cxnLst>
+                <a:cxn ang="0">
+                  <a:pos x="connsiteX0" y="connsiteY0"/>
+                </a:cxn>
+                <a:cxn ang="0">
+                  <a:pos x="connsiteX1" y="connsiteY1"/>
+                </a:cxn>
+                <a:cxn ang="0">
+                  <a:pos x="connsiteX2" y="connsiteY2"/>
+                </a:cxn>
+                <a:cxn ang="0">
+                  <a:pos x="connsiteX3" y="connsiteY3"/>
+                </a:cxn>
+                <a:cxn ang="0">
+                  <a:pos x="connsiteX4" y="connsiteY4"/>
+                </a:cxn>
+              </a:cxnLst>
+              <a:rect l="l" t="t" r="r" b="b"/>
+              <a:pathLst>
+                <a:path w="1430409" h="717102">
+                  <a:moveTo>
+                    <a:pt x="127526" y="0"/>
+                  </a:moveTo>
+                  <a:lnTo>
+                    <a:pt x="1430409" y="0"/>
+                  </a:lnTo>
+                  <a:lnTo>
+                    <a:pt x="1430409" y="717102"/>
+                  </a:lnTo>
+                  <a:lnTo>
+                    <a:pt x="0" y="717102"/>
+                  </a:lnTo>
+                  <a:cubicBezTo>
+                    <a:pt x="0" y="525635"/>
+                    <a:pt x="3329" y="305008"/>
+                    <a:pt x="3329" y="113541"/>
+                  </a:cubicBezTo>
+                </a:path>
+              </a:pathLst>
+            </a:custGeom>
+            <a:noFill/>
+            <a:ln w="19050">
+              <a:solidFill>
+                <a:schemeClr val="accent5"/>
+              </a:solidFill>
+            </a:ln>
+          </p:spPr>
+          <p:style>
+            <a:lnRef idx="2">
+              <a:schemeClr val="accent1">
+                <a:shade val="50000"/>
+              </a:schemeClr>
+            </a:lnRef>
+            <a:fillRef idx="1">
+              <a:schemeClr val="accent1"/>
+            </a:fillRef>
+            <a:effectRef idx="0">
+              <a:schemeClr val="accent1"/>
+            </a:effectRef>
+            <a:fontRef idx="minor">
+              <a:schemeClr val="lt1"/>
+            </a:fontRef>
+          </p:style>
+          <p:txBody>
+            <a:bodyPr rtlCol="0" anchor="ctr"/>
+            <a:lstStyle/>
+            <a:p>
+              <a:pPr algn="ctr"/>
+              <a:endParaRPr lang="en-US">
+                <a:solidFill>
+                  <a:schemeClr val="tx2"/>
+                </a:solidFill>
+              </a:endParaRPr>
+            </a:p>
+          </p:txBody>
+        </p:sp>
+        <p:pic>
+          <p:nvPicPr>
+            <p:cNvPr id="24" name="Graphic 23">
+              <a:extLst>
+                <a:ext uri="{FF2B5EF4-FFF2-40B4-BE49-F238E27FC236}">
+                  <a16:creationId xmlns:a16="http://schemas.microsoft.com/office/drawing/2014/main" id="{A9E1BA50-8920-AD4F-072E-1994F8EC1A67}"/>
+                </a:ext>
+              </a:extLst>
+            </p:cNvPr>
+            <p:cNvPicPr>
+              <a:picLocks noChangeAspect="1"/>
+            </p:cNvPicPr>
+            <p:nvPr/>
+          </p:nvPicPr>
+          <p:blipFill>
+            <a:blip r:embed="rId5" cstate="screen">
+              <a:extLst>
+                <a:ext uri="{28A0092B-C50C-407E-A947-70E740481C1C}">
+                  <a14:useLocalDpi xmlns:a14="http://schemas.microsoft.com/office/drawing/2010/main"/>
+                </a:ext>
+                <a:ext uri="{96DAC541-7B7A-43D3-8B79-37D633B846F1}">
+                  <asvg:svgBlip xmlns:asvg="http://schemas.microsoft.com/office/drawing/2016/SVG/main" r:embed="rId6"/>
+                </a:ext>
+              </a:extLst>
+            </a:blip>
+            <a:stretch>
+              <a:fillRect/>
+            </a:stretch>
+          </p:blipFill>
+          <p:spPr>
+            <a:xfrm>
+              <a:off x="7823289" y="3738776"/>
+              <a:ext cx="111105" cy="111105"/>
+            </a:xfrm>
+            <a:prstGeom prst="rect">
+              <a:avLst/>
+            </a:prstGeom>
+          </p:spPr>
+        </p:pic>
+      </p:grpSp>
+      <p:sp>
+        <p:nvSpPr>
+          <p:cNvPr id="14" name="Right Arrow 22">
+            <a:extLst>
+              <a:ext uri="{FF2B5EF4-FFF2-40B4-BE49-F238E27FC236}">
+                <a16:creationId xmlns:a16="http://schemas.microsoft.com/office/drawing/2014/main" id="{C978E200-4CCA-B67A-F271-2C40BF31C0A6}"/>
+              </a:ext>
+            </a:extLst>
+          </p:cNvPr>
+          <p:cNvSpPr/>
+          <p:nvPr/>
+        </p:nvSpPr>
+        <p:spPr>
+          <a:xfrm>
+            <a:off x="1637572" y="4277447"/>
+            <a:ext cx="533801" cy="477433"/>
+          </a:xfrm>
+          <a:prstGeom prst="rightArrow">
+            <a:avLst/>
+          </a:prstGeom>
+          <a:solidFill>
+            <a:schemeClr val="accent1"/>
+          </a:solidFill>
+          <a:ln>
+            <a:noFill/>
+          </a:ln>
+        </p:spPr>
+        <p:style>
+          <a:lnRef idx="2">
+            <a:schemeClr val="accent1">
+              <a:shade val="50000"/>
+            </a:schemeClr>
+          </a:lnRef>
+          <a:fillRef idx="1">
+            <a:schemeClr val="accent1"/>
+          </a:fillRef>
+          <a:effectRef idx="0">
+            <a:schemeClr val="accent1"/>
+          </a:effectRef>
+          <a:fontRef idx="minor">
+            <a:schemeClr val="lt1"/>
+          </a:fontRef>
+        </p:style>
+        <p:txBody>
+          <a:bodyPr lIns="0" rIns="0" rtlCol="0" anchor="ctr"/>
+          <a:lstStyle/>
+          <a:p>
+            <a:pPr algn="ctr"/>
+            <a:r>
+              <a:rPr lang="en-US"/>
+              <a:t>In</a:t>
+            </a:r>
+          </a:p>
+        </p:txBody>
+      </p:sp>
+      <p:sp>
+        <p:nvSpPr>
+          <p:cNvPr id="15" name="Right Arrow 23">
+            <a:extLst>
+              <a:ext uri="{FF2B5EF4-FFF2-40B4-BE49-F238E27FC236}">
+                <a16:creationId xmlns:a16="http://schemas.microsoft.com/office/drawing/2014/main" id="{3C1629C8-2966-C605-8996-B9F59599BFB9}"/>
+              </a:ext>
+            </a:extLst>
+          </p:cNvPr>
+          <p:cNvSpPr/>
+          <p:nvPr/>
+        </p:nvSpPr>
+        <p:spPr>
+          <a:xfrm>
+            <a:off x="9069420" y="4316113"/>
+            <a:ext cx="511111" cy="477433"/>
+          </a:xfrm>
+          <a:prstGeom prst="rightArrow">
+            <a:avLst/>
+          </a:prstGeom>
+          <a:solidFill>
+            <a:schemeClr val="accent1"/>
+          </a:solidFill>
+          <a:ln>
+            <a:noFill/>
+          </a:ln>
+        </p:spPr>
+        <p:style>
+          <a:lnRef idx="2">
+            <a:schemeClr val="accent1">
+              <a:shade val="50000"/>
+            </a:schemeClr>
+          </a:lnRef>
+          <a:fillRef idx="1">
+            <a:schemeClr val="accent1"/>
+          </a:fillRef>
+          <a:effectRef idx="0">
+            <a:schemeClr val="accent1"/>
+          </a:effectRef>
+          <a:fontRef idx="minor">
+            <a:schemeClr val="lt1"/>
+          </a:fontRef>
+        </p:style>
+        <p:txBody>
+          <a:bodyPr lIns="0" rIns="0" rtlCol="0" anchor="ctr"/>
+          <a:lstStyle/>
+          <a:p>
+            <a:pPr algn="ctr"/>
+            <a:r>
+              <a:rPr lang="en-US"/>
+              <a:t>Out</a:t>
+            </a:r>
+          </a:p>
+        </p:txBody>
+      </p:sp>
+      <p:grpSp>
+        <p:nvGrpSpPr>
+          <p:cNvPr id="16" name="Group 15">
+            <a:extLst>
+              <a:ext uri="{FF2B5EF4-FFF2-40B4-BE49-F238E27FC236}">
+                <a16:creationId xmlns:a16="http://schemas.microsoft.com/office/drawing/2014/main" id="{89208AE2-345F-65AE-61C0-9336D2C64F7F}"/>
+              </a:ext>
+            </a:extLst>
+          </p:cNvPr>
+          <p:cNvGrpSpPr/>
+          <p:nvPr/>
+        </p:nvGrpSpPr>
+        <p:grpSpPr>
+          <a:xfrm>
+            <a:off x="4212860" y="4417403"/>
+            <a:ext cx="578193" cy="275018"/>
+            <a:chOff x="3726396" y="5695672"/>
+            <a:chExt cx="1571726" cy="138979"/>
+          </a:xfrm>
+        </p:grpSpPr>
+        <p:cxnSp>
+          <p:nvCxnSpPr>
+            <p:cNvPr id="20" name="Straight Connector 19">
+              <a:extLst>
+                <a:ext uri="{FF2B5EF4-FFF2-40B4-BE49-F238E27FC236}">
+                  <a16:creationId xmlns:a16="http://schemas.microsoft.com/office/drawing/2014/main" id="{AF25D424-58CC-BDC6-0879-1CACC3ED7F80}"/>
+                </a:ext>
+              </a:extLst>
+            </p:cNvPr>
+            <p:cNvCxnSpPr>
+              <a:cxnSpLocks/>
+            </p:cNvCxnSpPr>
+            <p:nvPr/>
+          </p:nvCxnSpPr>
+          <p:spPr>
+            <a:xfrm>
+              <a:off x="3726396" y="5765120"/>
+              <a:ext cx="1571255" cy="0"/>
+            </a:xfrm>
+            <a:prstGeom prst="line">
+              <a:avLst/>
+            </a:prstGeom>
+            <a:ln w="19050">
+              <a:solidFill>
+                <a:srgbClr val="00C1DE"/>
+              </a:solidFill>
+            </a:ln>
+          </p:spPr>
+          <p:style>
+            <a:lnRef idx="1">
+              <a:schemeClr val="accent1"/>
+            </a:lnRef>
+            <a:fillRef idx="0">
+              <a:schemeClr val="accent1"/>
+            </a:fillRef>
+            <a:effectRef idx="0">
+              <a:schemeClr val="accent1"/>
+            </a:effectRef>
+            <a:fontRef idx="minor">
+              <a:schemeClr val="tx1"/>
+            </a:fontRef>
+          </p:style>
+        </p:cxnSp>
+        <p:cxnSp>
+          <p:nvCxnSpPr>
+            <p:cNvPr id="21" name="Straight Connector 20">
+              <a:extLst>
+                <a:ext uri="{FF2B5EF4-FFF2-40B4-BE49-F238E27FC236}">
+                  <a16:creationId xmlns:a16="http://schemas.microsoft.com/office/drawing/2014/main" id="{BC28E212-C834-380A-ACDB-7B57816AA9E3}"/>
+                </a:ext>
+              </a:extLst>
+            </p:cNvPr>
+            <p:cNvCxnSpPr>
+              <a:cxnSpLocks/>
+            </p:cNvCxnSpPr>
+            <p:nvPr/>
+          </p:nvCxnSpPr>
+          <p:spPr>
+            <a:xfrm>
+              <a:off x="3726396" y="5695672"/>
+              <a:ext cx="1571726" cy="0"/>
+            </a:xfrm>
+            <a:prstGeom prst="line">
+              <a:avLst/>
+            </a:prstGeom>
+            <a:ln w="19050">
+              <a:solidFill>
+                <a:srgbClr val="00C1DE"/>
+              </a:solidFill>
+            </a:ln>
+          </p:spPr>
+          <p:style>
+            <a:lnRef idx="1">
+              <a:schemeClr val="accent1"/>
+            </a:lnRef>
+            <a:fillRef idx="0">
+              <a:schemeClr val="accent1"/>
+            </a:fillRef>
+            <a:effectRef idx="0">
+              <a:schemeClr val="accent1"/>
+            </a:effectRef>
+            <a:fontRef idx="minor">
+              <a:schemeClr val="tx1"/>
+            </a:fontRef>
+          </p:style>
+        </p:cxnSp>
+        <p:cxnSp>
+          <p:nvCxnSpPr>
+            <p:cNvPr id="22" name="Straight Connector 21">
+              <a:extLst>
+                <a:ext uri="{FF2B5EF4-FFF2-40B4-BE49-F238E27FC236}">
+                  <a16:creationId xmlns:a16="http://schemas.microsoft.com/office/drawing/2014/main" id="{FFB2BA50-26EA-B01B-320E-FD09F845D3FE}"/>
+                </a:ext>
+              </a:extLst>
+            </p:cNvPr>
+            <p:cNvCxnSpPr>
+              <a:cxnSpLocks/>
+            </p:cNvCxnSpPr>
+            <p:nvPr/>
+          </p:nvCxnSpPr>
+          <p:spPr>
+            <a:xfrm>
+              <a:off x="3726396" y="5834651"/>
+              <a:ext cx="1571726" cy="0"/>
+            </a:xfrm>
+            <a:prstGeom prst="line">
+              <a:avLst/>
+            </a:prstGeom>
+            <a:ln w="19050">
+              <a:solidFill>
+                <a:srgbClr val="00C1DE"/>
+              </a:solidFill>
+            </a:ln>
+          </p:spPr>
+          <p:style>
+            <a:lnRef idx="1">
+              <a:schemeClr val="accent1"/>
+            </a:lnRef>
+            <a:fillRef idx="0">
+              <a:schemeClr val="accent1"/>
+            </a:fillRef>
+            <a:effectRef idx="0">
+              <a:schemeClr val="accent1"/>
+            </a:effectRef>
+            <a:fontRef idx="minor">
+              <a:schemeClr val="tx1"/>
+            </a:fontRef>
+          </p:style>
+        </p:cxnSp>
+      </p:grpSp>
+      <p:grpSp>
+        <p:nvGrpSpPr>
+          <p:cNvPr id="17" name="Group 16">
+            <a:extLst>
+              <a:ext uri="{FF2B5EF4-FFF2-40B4-BE49-F238E27FC236}">
+                <a16:creationId xmlns:a16="http://schemas.microsoft.com/office/drawing/2014/main" id="{765170E0-B20C-3258-54E6-2AC578B2E620}"/>
+              </a:ext>
+            </a:extLst>
+          </p:cNvPr>
+          <p:cNvGrpSpPr/>
+          <p:nvPr/>
+        </p:nvGrpSpPr>
+        <p:grpSpPr>
+          <a:xfrm>
+            <a:off x="4743203" y="3916865"/>
+            <a:ext cx="1913738" cy="1213101"/>
+            <a:chOff x="5298122" y="3755964"/>
+            <a:chExt cx="1884724" cy="1406845"/>
+          </a:xfrm>
+        </p:grpSpPr>
+        <p:sp>
+          <p:nvSpPr>
+            <p:cNvPr id="18" name="Freeform 9">
+              <a:extLst>
+                <a:ext uri="{FF2B5EF4-FFF2-40B4-BE49-F238E27FC236}">
+                  <a16:creationId xmlns:a16="http://schemas.microsoft.com/office/drawing/2014/main" id="{F1EC4E7B-2ED2-3A7C-2C15-6B34F3C54048}"/>
+                </a:ext>
+              </a:extLst>
+            </p:cNvPr>
+            <p:cNvSpPr/>
+            <p:nvPr/>
+          </p:nvSpPr>
+          <p:spPr>
+            <a:xfrm>
+              <a:off x="5358478" y="3795104"/>
+              <a:ext cx="1824368" cy="1367705"/>
+            </a:xfrm>
+            <a:custGeom>
+              <a:avLst/>
+              <a:gdLst>
+                <a:gd name="connsiteX0" fmla="*/ 178326 w 1430409"/>
+                <a:gd name="connsiteY0" fmla="*/ 0 h 717102"/>
+                <a:gd name="connsiteX1" fmla="*/ 1430409 w 1430409"/>
+                <a:gd name="connsiteY1" fmla="*/ 0 h 717102"/>
+                <a:gd name="connsiteX2" fmla="*/ 1430409 w 1430409"/>
+                <a:gd name="connsiteY2" fmla="*/ 717102 h 717102"/>
+                <a:gd name="connsiteX3" fmla="*/ 0 w 1430409"/>
+                <a:gd name="connsiteY3" fmla="*/ 717102 h 717102"/>
+                <a:gd name="connsiteX4" fmla="*/ 0 w 1430409"/>
+                <a:gd name="connsiteY4" fmla="*/ 178327 h 717102"/>
+                <a:gd name="connsiteX0" fmla="*/ 127526 w 1430409"/>
+                <a:gd name="connsiteY0" fmla="*/ 0 h 717102"/>
+                <a:gd name="connsiteX1" fmla="*/ 1430409 w 1430409"/>
+                <a:gd name="connsiteY1" fmla="*/ 0 h 717102"/>
+                <a:gd name="connsiteX2" fmla="*/ 1430409 w 1430409"/>
+                <a:gd name="connsiteY2" fmla="*/ 717102 h 717102"/>
+                <a:gd name="connsiteX3" fmla="*/ 0 w 1430409"/>
+                <a:gd name="connsiteY3" fmla="*/ 717102 h 717102"/>
+                <a:gd name="connsiteX4" fmla="*/ 0 w 1430409"/>
+                <a:gd name="connsiteY4" fmla="*/ 178327 h 717102"/>
+                <a:gd name="connsiteX0" fmla="*/ 127526 w 1430409"/>
+                <a:gd name="connsiteY0" fmla="*/ 0 h 717102"/>
+                <a:gd name="connsiteX1" fmla="*/ 1430409 w 1430409"/>
+                <a:gd name="connsiteY1" fmla="*/ 0 h 717102"/>
+                <a:gd name="connsiteX2" fmla="*/ 1430409 w 1430409"/>
+                <a:gd name="connsiteY2" fmla="*/ 717102 h 717102"/>
+                <a:gd name="connsiteX3" fmla="*/ 0 w 1430409"/>
+                <a:gd name="connsiteY3" fmla="*/ 717102 h 717102"/>
+                <a:gd name="connsiteX4" fmla="*/ 0 w 1430409"/>
+                <a:gd name="connsiteY4" fmla="*/ 127527 h 717102"/>
+                <a:gd name="connsiteX0" fmla="*/ 127526 w 1430409"/>
+                <a:gd name="connsiteY0" fmla="*/ 0 h 717102"/>
+                <a:gd name="connsiteX1" fmla="*/ 1430409 w 1430409"/>
+                <a:gd name="connsiteY1" fmla="*/ 0 h 717102"/>
+                <a:gd name="connsiteX2" fmla="*/ 1430409 w 1430409"/>
+                <a:gd name="connsiteY2" fmla="*/ 717102 h 717102"/>
+                <a:gd name="connsiteX3" fmla="*/ 0 w 1430409"/>
+                <a:gd name="connsiteY3" fmla="*/ 717102 h 717102"/>
+                <a:gd name="connsiteX4" fmla="*/ 0 w 1430409"/>
+                <a:gd name="connsiteY4" fmla="*/ 168348 h 717102"/>
+                <a:gd name="connsiteX0" fmla="*/ 127526 w 1430409"/>
+                <a:gd name="connsiteY0" fmla="*/ 0 h 717102"/>
+                <a:gd name="connsiteX1" fmla="*/ 1430409 w 1430409"/>
+                <a:gd name="connsiteY1" fmla="*/ 0 h 717102"/>
+                <a:gd name="connsiteX2" fmla="*/ 1430409 w 1430409"/>
+                <a:gd name="connsiteY2" fmla="*/ 717102 h 717102"/>
+                <a:gd name="connsiteX3" fmla="*/ 0 w 1430409"/>
+                <a:gd name="connsiteY3" fmla="*/ 717102 h 717102"/>
+                <a:gd name="connsiteX4" fmla="*/ 0 w 1430409"/>
+                <a:gd name="connsiteY4" fmla="*/ 120259 h 717102"/>
+                <a:gd name="connsiteX0" fmla="*/ 127526 w 1430409"/>
+                <a:gd name="connsiteY0" fmla="*/ 0 h 717102"/>
+                <a:gd name="connsiteX1" fmla="*/ 1430409 w 1430409"/>
+                <a:gd name="connsiteY1" fmla="*/ 0 h 717102"/>
+                <a:gd name="connsiteX2" fmla="*/ 1430409 w 1430409"/>
+                <a:gd name="connsiteY2" fmla="*/ 717102 h 717102"/>
+                <a:gd name="connsiteX3" fmla="*/ 0 w 1430409"/>
+                <a:gd name="connsiteY3" fmla="*/ 717102 h 717102"/>
+                <a:gd name="connsiteX4" fmla="*/ 0 w 1430409"/>
+                <a:gd name="connsiteY4" fmla="*/ 142700 h 717102"/>
+                <a:gd name="connsiteX0" fmla="*/ 127526 w 1430409"/>
+                <a:gd name="connsiteY0" fmla="*/ 0 h 717102"/>
+                <a:gd name="connsiteX1" fmla="*/ 1430409 w 1430409"/>
+                <a:gd name="connsiteY1" fmla="*/ 0 h 717102"/>
+                <a:gd name="connsiteX2" fmla="*/ 1430409 w 1430409"/>
+                <a:gd name="connsiteY2" fmla="*/ 717102 h 717102"/>
+                <a:gd name="connsiteX3" fmla="*/ 0 w 1430409"/>
+                <a:gd name="connsiteY3" fmla="*/ 717102 h 717102"/>
+                <a:gd name="connsiteX4" fmla="*/ 3329 w 1430409"/>
+                <a:gd name="connsiteY4" fmla="*/ 113541 h 717102"/>
+              </a:gdLst>
+              <a:ahLst/>
+              <a:cxnLst>
+                <a:cxn ang="0">
+                  <a:pos x="connsiteX0" y="connsiteY0"/>
+                </a:cxn>
+                <a:cxn ang="0">
+                  <a:pos x="connsiteX1" y="connsiteY1"/>
+                </a:cxn>
+                <a:cxn ang="0">
+                  <a:pos x="connsiteX2" y="connsiteY2"/>
+                </a:cxn>
+                <a:cxn ang="0">
+                  <a:pos x="connsiteX3" y="connsiteY3"/>
+                </a:cxn>
+                <a:cxn ang="0">
+                  <a:pos x="connsiteX4" y="connsiteY4"/>
+                </a:cxn>
+              </a:cxnLst>
+              <a:rect l="l" t="t" r="r" b="b"/>
+              <a:pathLst>
+                <a:path w="1430409" h="717102">
+                  <a:moveTo>
+                    <a:pt x="127526" y="0"/>
+                  </a:moveTo>
+                  <a:lnTo>
+                    <a:pt x="1430409" y="0"/>
+                  </a:lnTo>
+                  <a:lnTo>
+                    <a:pt x="1430409" y="717102"/>
+                  </a:lnTo>
+                  <a:lnTo>
+                    <a:pt x="0" y="717102"/>
+                  </a:lnTo>
+                  <a:cubicBezTo>
+                    <a:pt x="0" y="525635"/>
+                    <a:pt x="3329" y="305008"/>
+                    <a:pt x="3329" y="113541"/>
+                  </a:cubicBezTo>
+                </a:path>
+              </a:pathLst>
+            </a:custGeom>
+            <a:noFill/>
+            <a:ln w="19050">
+              <a:solidFill>
+                <a:srgbClr val="95D600"/>
+              </a:solidFill>
+            </a:ln>
+          </p:spPr>
+          <p:style>
+            <a:lnRef idx="2">
+              <a:schemeClr val="accent1">
+                <a:shade val="50000"/>
+              </a:schemeClr>
+            </a:lnRef>
+            <a:fillRef idx="1">
+              <a:schemeClr val="accent1"/>
+            </a:fillRef>
+            <a:effectRef idx="0">
+              <a:schemeClr val="accent1"/>
+            </a:effectRef>
+            <a:fontRef idx="minor">
+              <a:schemeClr val="lt1"/>
+            </a:fontRef>
+          </p:style>
+          <p:txBody>
+            <a:bodyPr rtlCol="0" anchor="ctr"/>
+            <a:lstStyle/>
+            <a:p>
+              <a:pPr algn="ctr"/>
+              <a:endParaRPr lang="en-US">
+                <a:solidFill>
+                  <a:schemeClr val="tx2"/>
+                </a:solidFill>
+              </a:endParaRPr>
+            </a:p>
+          </p:txBody>
+        </p:sp>
+        <p:pic>
+          <p:nvPicPr>
+            <p:cNvPr id="19" name="Graphic 18">
+              <a:extLst>
+                <a:ext uri="{FF2B5EF4-FFF2-40B4-BE49-F238E27FC236}">
+                  <a16:creationId xmlns:a16="http://schemas.microsoft.com/office/drawing/2014/main" id="{A289FF69-625A-5381-57DF-DF833D5BECCC}"/>
+                </a:ext>
+              </a:extLst>
+            </p:cNvPr>
+            <p:cNvPicPr>
+              <a:picLocks noChangeAspect="1"/>
+            </p:cNvPicPr>
+            <p:nvPr/>
+          </p:nvPicPr>
+          <p:blipFill>
+            <a:blip r:embed="rId3" cstate="screen">
+              <a:extLst>
+                <a:ext uri="{28A0092B-C50C-407E-A947-70E740481C1C}">
+                  <a14:useLocalDpi xmlns:a14="http://schemas.microsoft.com/office/drawing/2010/main"/>
+                </a:ext>
+                <a:ext uri="{96DAC541-7B7A-43D3-8B79-37D633B846F1}">
+                  <asvg:svgBlip xmlns:asvg="http://schemas.microsoft.com/office/drawing/2016/SVG/main" r:embed="rId4"/>
+                </a:ext>
+              </a:extLst>
+            </a:blip>
+            <a:stretch>
+              <a:fillRect/>
+            </a:stretch>
+          </p:blipFill>
+          <p:spPr>
+            <a:xfrm>
+              <a:off x="5298122" y="3755964"/>
+              <a:ext cx="111105" cy="111105"/>
+            </a:xfrm>
+            <a:prstGeom prst="rect">
+              <a:avLst/>
+            </a:prstGeom>
+          </p:spPr>
+        </p:pic>
+      </p:grpSp>
+      <p:sp>
+        <p:nvSpPr>
+          <p:cNvPr id="27" name="Rectangle: Rounded Corners 26">
+            <a:extLst>
+              <a:ext uri="{FF2B5EF4-FFF2-40B4-BE49-F238E27FC236}">
+                <a16:creationId xmlns:a16="http://schemas.microsoft.com/office/drawing/2014/main" id="{E2953792-334A-FB9A-0C84-350962AAA75F}"/>
+              </a:ext>
+            </a:extLst>
+          </p:cNvPr>
+          <p:cNvSpPr/>
+          <p:nvPr/>
+        </p:nvSpPr>
+        <p:spPr>
+          <a:xfrm>
+            <a:off x="2023799" y="3713364"/>
+            <a:ext cx="2301467" cy="1571400"/>
+          </a:xfrm>
+          <a:prstGeom prst="roundRect">
+            <a:avLst/>
+          </a:prstGeom>
+          <a:solidFill>
+            <a:schemeClr val="accent1">
+              <a:alpha val="7000"/>
+            </a:schemeClr>
+          </a:solidFill>
+          <a:ln>
+            <a:noFill/>
+          </a:ln>
+        </p:spPr>
+        <p:style>
+          <a:lnRef idx="2">
+            <a:schemeClr val="accent1">
+              <a:shade val="50000"/>
+            </a:schemeClr>
+          </a:lnRef>
+          <a:fillRef idx="1">
+            <a:schemeClr val="accent1"/>
+          </a:fillRef>
+          <a:effectRef idx="0">
+            <a:schemeClr val="accent1"/>
+          </a:effectRef>
+          <a:fontRef idx="minor">
+            <a:schemeClr val="lt1"/>
+          </a:fontRef>
+        </p:style>
+        <p:txBody>
+          <a:bodyPr rtlCol="0" anchor="ctr"/>
+          <a:lstStyle/>
+          <a:p>
+            <a:pPr algn="ctr"/>
+            <a:endParaRPr lang="en-US"/>
+          </a:p>
+        </p:txBody>
+      </p:sp>
+      <p:sp>
+        <p:nvSpPr>
+          <p:cNvPr id="28" name="Rectangle: Rounded Corners 27">
+            <a:extLst>
+              <a:ext uri="{FF2B5EF4-FFF2-40B4-BE49-F238E27FC236}">
+                <a16:creationId xmlns:a16="http://schemas.microsoft.com/office/drawing/2014/main" id="{A962F2A0-C63F-79C9-B13F-3DFC0B1F3F07}"/>
+              </a:ext>
+            </a:extLst>
+          </p:cNvPr>
+          <p:cNvSpPr/>
+          <p:nvPr/>
+        </p:nvSpPr>
+        <p:spPr>
+          <a:xfrm>
+            <a:off x="4646354" y="3713365"/>
+            <a:ext cx="2182114" cy="1571400"/>
+          </a:xfrm>
+          <a:prstGeom prst="roundRect">
+            <a:avLst/>
+          </a:prstGeom>
+          <a:solidFill>
+            <a:schemeClr val="accent1">
+              <a:alpha val="7000"/>
+            </a:schemeClr>
+          </a:solidFill>
+          <a:ln>
+            <a:noFill/>
+          </a:ln>
+        </p:spPr>
+        <p:style>
+          <a:lnRef idx="2">
+            <a:schemeClr val="accent1">
+              <a:shade val="50000"/>
+            </a:schemeClr>
+          </a:lnRef>
+          <a:fillRef idx="1">
+            <a:schemeClr val="accent1"/>
+          </a:fillRef>
+          <a:effectRef idx="0">
+            <a:schemeClr val="accent1"/>
+          </a:effectRef>
+          <a:fontRef idx="minor">
+            <a:schemeClr val="lt1"/>
+          </a:fontRef>
+        </p:style>
+        <p:txBody>
+          <a:bodyPr rtlCol="0" anchor="ctr"/>
+          <a:lstStyle/>
+          <a:p>
+            <a:pPr algn="ctr"/>
+            <a:endParaRPr lang="en-US"/>
+          </a:p>
+        </p:txBody>
+      </p:sp>
+      <p:sp>
+        <p:nvSpPr>
+          <p:cNvPr id="29" name="Rectangle: Rounded Corners 28">
+            <a:extLst>
+              <a:ext uri="{FF2B5EF4-FFF2-40B4-BE49-F238E27FC236}">
+                <a16:creationId xmlns:a16="http://schemas.microsoft.com/office/drawing/2014/main" id="{67A4225F-7650-56B9-AFB4-E50F067A9B00}"/>
+              </a:ext>
+            </a:extLst>
+          </p:cNvPr>
+          <p:cNvSpPr/>
+          <p:nvPr/>
+        </p:nvSpPr>
+        <p:spPr>
+          <a:xfrm>
+            <a:off x="7057207" y="3713242"/>
+            <a:ext cx="2213345" cy="1641679"/>
+          </a:xfrm>
+          <a:prstGeom prst="roundRect">
+            <a:avLst/>
+          </a:prstGeom>
+          <a:solidFill>
+            <a:schemeClr val="accent1">
+              <a:alpha val="7000"/>
+            </a:schemeClr>
+          </a:solidFill>
+          <a:ln>
+            <a:noFill/>
+          </a:ln>
+        </p:spPr>
+        <p:style>
+          <a:lnRef idx="2">
+            <a:schemeClr val="accent1">
+              <a:shade val="50000"/>
+            </a:schemeClr>
+          </a:lnRef>
+          <a:fillRef idx="1">
+            <a:schemeClr val="accent1"/>
+          </a:fillRef>
+          <a:effectRef idx="0">
+            <a:schemeClr val="accent1"/>
+          </a:effectRef>
+          <a:fontRef idx="minor">
+            <a:schemeClr val="lt1"/>
+          </a:fontRef>
+        </p:style>
+        <p:txBody>
+          <a:bodyPr rtlCol="0" anchor="ctr"/>
+          <a:lstStyle/>
+          <a:p>
+            <a:pPr algn="ctr"/>
+            <a:endParaRPr lang="en-US"/>
+          </a:p>
+        </p:txBody>
+      </p:sp>
+      <p:sp>
+        <p:nvSpPr>
+          <p:cNvPr id="41" name="Rectangle 40">
+            <a:extLst>
+              <a:ext uri="{FF2B5EF4-FFF2-40B4-BE49-F238E27FC236}">
+                <a16:creationId xmlns:a16="http://schemas.microsoft.com/office/drawing/2014/main" id="{7927FE7C-7BD4-31CE-B092-3CF829FC9508}"/>
+              </a:ext>
+            </a:extLst>
+          </p:cNvPr>
+          <p:cNvSpPr/>
+          <p:nvPr/>
+        </p:nvSpPr>
+        <p:spPr>
+          <a:xfrm>
+            <a:off x="992848" y="1580861"/>
+            <a:ext cx="819018" cy="786311"/>
+          </a:xfrm>
+          <a:prstGeom prst="rect">
+            <a:avLst/>
+          </a:prstGeom>
+          <a:solidFill>
+            <a:schemeClr val="bg1"/>
+          </a:solidFill>
+          <a:ln w="19050">
+            <a:solidFill>
+              <a:schemeClr val="tx1"/>
+            </a:solidFill>
+          </a:ln>
+        </p:spPr>
+        <p:style>
+          <a:lnRef idx="2">
+            <a:schemeClr val="accent1">
+              <a:shade val="50000"/>
+            </a:schemeClr>
+          </a:lnRef>
+          <a:fillRef idx="1">
+            <a:schemeClr val="accent1"/>
+          </a:fillRef>
+          <a:effectRef idx="0">
+            <a:schemeClr val="accent1"/>
+          </a:effectRef>
+          <a:fontRef idx="minor">
+            <a:schemeClr val="lt1"/>
+          </a:fontRef>
+        </p:style>
+        <p:txBody>
+          <a:bodyPr rtlCol="0" anchor="ctr"/>
+          <a:lstStyle/>
+          <a:p>
+            <a:pPr algn="ctr"/>
+            <a:r>
+              <a:rPr lang="en-US">
+                <a:solidFill>
+                  <a:schemeClr val="tx1"/>
+                </a:solidFill>
+              </a:rPr>
+              <a:t>Source</a:t>
+            </a:r>
+          </a:p>
+        </p:txBody>
+      </p:sp>
+      <p:sp>
+        <p:nvSpPr>
+          <p:cNvPr id="42" name="Rectangle 41">
+            <a:extLst>
+              <a:ext uri="{FF2B5EF4-FFF2-40B4-BE49-F238E27FC236}">
+                <a16:creationId xmlns:a16="http://schemas.microsoft.com/office/drawing/2014/main" id="{7DB72213-581E-DE8B-B2C2-DF73145E74D9}"/>
+              </a:ext>
+            </a:extLst>
+          </p:cNvPr>
+          <p:cNvSpPr/>
+          <p:nvPr/>
+        </p:nvSpPr>
+        <p:spPr>
+          <a:xfrm>
+            <a:off x="2996245" y="1578386"/>
+            <a:ext cx="1390072" cy="786311"/>
+          </a:xfrm>
+          <a:prstGeom prst="rect">
+            <a:avLst/>
+          </a:prstGeom>
+          <a:solidFill>
+            <a:schemeClr val="bg1"/>
+          </a:solidFill>
+          <a:ln w="19050">
+            <a:solidFill>
+              <a:schemeClr val="tx1"/>
+            </a:solidFill>
+          </a:ln>
+        </p:spPr>
+        <p:style>
+          <a:lnRef idx="2">
+            <a:schemeClr val="accent1">
+              <a:shade val="50000"/>
+            </a:schemeClr>
+          </a:lnRef>
+          <a:fillRef idx="1">
+            <a:schemeClr val="accent1"/>
+          </a:fillRef>
+          <a:effectRef idx="0">
+            <a:schemeClr val="accent1"/>
+          </a:effectRef>
+          <a:fontRef idx="minor">
+            <a:schemeClr val="lt1"/>
+          </a:fontRef>
+        </p:style>
+        <p:txBody>
+          <a:bodyPr rtlCol="0" anchor="ctr"/>
+          <a:lstStyle/>
+          <a:p>
+            <a:pPr algn="ctr"/>
+            <a:r>
+              <a:rPr lang="en-US" dirty="0">
+                <a:solidFill>
+                  <a:schemeClr val="tx1"/>
+                </a:solidFill>
+              </a:rPr>
+              <a:t>Filter</a:t>
+            </a:r>
+            <a:br>
+              <a:rPr lang="en-US" dirty="0">
+                <a:solidFill>
+                  <a:schemeClr val="tx1"/>
+                </a:solidFill>
+              </a:rPr>
+            </a:br>
+            <a:r>
+              <a:rPr lang="en-US" sz="1200" dirty="0">
+                <a:solidFill>
+                  <a:schemeClr val="tx1"/>
+                </a:solidFill>
+              </a:rPr>
+              <a:t>(processing node)</a:t>
+            </a:r>
+          </a:p>
+        </p:txBody>
+      </p:sp>
+      <p:sp>
+        <p:nvSpPr>
+          <p:cNvPr id="43" name="Rectangle 42">
+            <a:extLst>
+              <a:ext uri="{FF2B5EF4-FFF2-40B4-BE49-F238E27FC236}">
+                <a16:creationId xmlns:a16="http://schemas.microsoft.com/office/drawing/2014/main" id="{75F18ED8-206B-2E5C-CCCF-EE90D6D95B96}"/>
+              </a:ext>
+            </a:extLst>
+          </p:cNvPr>
+          <p:cNvSpPr/>
+          <p:nvPr/>
+        </p:nvSpPr>
+        <p:spPr>
+          <a:xfrm>
+            <a:off x="5624634" y="1584780"/>
+            <a:ext cx="1390072" cy="786311"/>
+          </a:xfrm>
+          <a:prstGeom prst="rect">
+            <a:avLst/>
+          </a:prstGeom>
+          <a:solidFill>
+            <a:schemeClr val="bg1"/>
+          </a:solidFill>
+          <a:ln w="19050">
+            <a:solidFill>
+              <a:schemeClr val="tx1"/>
+            </a:solidFill>
+          </a:ln>
+        </p:spPr>
+        <p:style>
+          <a:lnRef idx="2">
+            <a:schemeClr val="accent1">
+              <a:shade val="50000"/>
+            </a:schemeClr>
+          </a:lnRef>
+          <a:fillRef idx="1">
+            <a:schemeClr val="accent1"/>
+          </a:fillRef>
+          <a:effectRef idx="0">
+            <a:schemeClr val="accent1"/>
+          </a:effectRef>
+          <a:fontRef idx="minor">
+            <a:schemeClr val="lt1"/>
+          </a:fontRef>
+        </p:style>
+        <p:txBody>
+          <a:bodyPr rtlCol="0" anchor="ctr"/>
+          <a:lstStyle/>
+          <a:p>
+            <a:pPr algn="ctr"/>
+            <a:r>
+              <a:rPr lang="en-US" dirty="0">
+                <a:solidFill>
+                  <a:schemeClr val="tx1"/>
+                </a:solidFill>
+              </a:rPr>
+              <a:t>Detector</a:t>
+            </a:r>
+            <a:br>
+              <a:rPr lang="en-US" dirty="0">
+                <a:solidFill>
+                  <a:schemeClr val="tx1"/>
+                </a:solidFill>
+              </a:rPr>
+            </a:br>
+            <a:r>
+              <a:rPr lang="en-US" sz="1200" dirty="0">
+                <a:solidFill>
+                  <a:schemeClr val="tx1"/>
+                </a:solidFill>
+              </a:rPr>
+              <a:t>(processing node)</a:t>
+            </a:r>
+            <a:endParaRPr lang="en-US" dirty="0">
+              <a:solidFill>
+                <a:schemeClr val="tx1"/>
+              </a:solidFill>
+            </a:endParaRPr>
+          </a:p>
+        </p:txBody>
+      </p:sp>
+      <p:sp>
+        <p:nvSpPr>
+          <p:cNvPr id="44" name="Rectangle 43">
+            <a:extLst>
+              <a:ext uri="{FF2B5EF4-FFF2-40B4-BE49-F238E27FC236}">
+                <a16:creationId xmlns:a16="http://schemas.microsoft.com/office/drawing/2014/main" id="{FBF04C2B-E5EF-9D7F-5B9E-68FB4399069C}"/>
+              </a:ext>
+            </a:extLst>
+          </p:cNvPr>
+          <p:cNvSpPr/>
+          <p:nvPr/>
+        </p:nvSpPr>
+        <p:spPr>
+          <a:xfrm>
+            <a:off x="8162563" y="1570181"/>
+            <a:ext cx="856426" cy="786311"/>
+          </a:xfrm>
+          <a:prstGeom prst="rect">
+            <a:avLst/>
+          </a:prstGeom>
+          <a:solidFill>
+            <a:schemeClr val="bg1"/>
+          </a:solidFill>
+          <a:ln w="19050">
+            <a:solidFill>
+              <a:schemeClr val="tx1"/>
+            </a:solidFill>
+          </a:ln>
+        </p:spPr>
+        <p:style>
+          <a:lnRef idx="2">
+            <a:schemeClr val="accent1">
+              <a:shade val="50000"/>
+            </a:schemeClr>
+          </a:lnRef>
+          <a:fillRef idx="1">
+            <a:schemeClr val="accent1"/>
+          </a:fillRef>
+          <a:effectRef idx="0">
+            <a:schemeClr val="accent1"/>
+          </a:effectRef>
+          <a:fontRef idx="minor">
+            <a:schemeClr val="lt1"/>
+          </a:fontRef>
+        </p:style>
+        <p:txBody>
+          <a:bodyPr rtlCol="0" anchor="ctr"/>
+          <a:lstStyle/>
+          <a:p>
+            <a:pPr algn="ctr"/>
+            <a:r>
+              <a:rPr lang="en-US">
+                <a:solidFill>
+                  <a:schemeClr val="tx1"/>
+                </a:solidFill>
+              </a:rPr>
+              <a:t>Sink</a:t>
+            </a:r>
+          </a:p>
+        </p:txBody>
+      </p:sp>
+      <p:cxnSp>
+        <p:nvCxnSpPr>
+          <p:cNvPr id="45" name="Straight Arrow Connector 44">
+            <a:extLst>
+              <a:ext uri="{FF2B5EF4-FFF2-40B4-BE49-F238E27FC236}">
+                <a16:creationId xmlns:a16="http://schemas.microsoft.com/office/drawing/2014/main" id="{05C1A7FB-E56E-4AD4-0B08-6258EE27FECE}"/>
+              </a:ext>
+            </a:extLst>
+          </p:cNvPr>
+          <p:cNvCxnSpPr>
+            <a:cxnSpLocks/>
+            <a:stCxn id="41" idx="3"/>
+            <a:endCxn id="42" idx="1"/>
+          </p:cNvCxnSpPr>
+          <p:nvPr/>
+        </p:nvCxnSpPr>
+        <p:spPr>
+          <a:xfrm flipV="1">
+            <a:off x="1811866" y="1971542"/>
+            <a:ext cx="1184379" cy="2475"/>
+          </a:xfrm>
+          <a:prstGeom prst="straightConnector1">
+            <a:avLst/>
+          </a:prstGeom>
+          <a:ln w="12700">
+            <a:tailEnd type="triangle"/>
+          </a:ln>
+        </p:spPr>
+        <p:style>
+          <a:lnRef idx="1">
+            <a:schemeClr val="accent1"/>
+          </a:lnRef>
+          <a:fillRef idx="0">
+            <a:schemeClr val="accent1"/>
+          </a:fillRef>
+          <a:effectRef idx="0">
+            <a:schemeClr val="accent1"/>
+          </a:effectRef>
+          <a:fontRef idx="minor">
+            <a:schemeClr val="tx1"/>
+          </a:fontRef>
+        </p:style>
+      </p:cxnSp>
+      <p:cxnSp>
+        <p:nvCxnSpPr>
+          <p:cNvPr id="46" name="Straight Arrow Connector 45">
+            <a:extLst>
+              <a:ext uri="{FF2B5EF4-FFF2-40B4-BE49-F238E27FC236}">
+                <a16:creationId xmlns:a16="http://schemas.microsoft.com/office/drawing/2014/main" id="{A23DA52D-E045-34F0-73B4-552D2486DDF6}"/>
+              </a:ext>
+            </a:extLst>
+          </p:cNvPr>
+          <p:cNvCxnSpPr>
+            <a:cxnSpLocks/>
+            <a:stCxn id="42" idx="3"/>
+            <a:endCxn id="43" idx="1"/>
+          </p:cNvCxnSpPr>
+          <p:nvPr/>
+        </p:nvCxnSpPr>
+        <p:spPr>
+          <a:xfrm>
+            <a:off x="4386317" y="1971542"/>
+            <a:ext cx="1238317" cy="6394"/>
+          </a:xfrm>
+          <a:prstGeom prst="straightConnector1">
+            <a:avLst/>
+          </a:prstGeom>
+          <a:ln w="12700">
+            <a:tailEnd type="triangle"/>
+          </a:ln>
+        </p:spPr>
+        <p:style>
+          <a:lnRef idx="1">
+            <a:schemeClr val="accent1"/>
+          </a:lnRef>
+          <a:fillRef idx="0">
+            <a:schemeClr val="accent1"/>
+          </a:fillRef>
+          <a:effectRef idx="0">
+            <a:schemeClr val="accent1"/>
+          </a:effectRef>
+          <a:fontRef idx="minor">
+            <a:schemeClr val="tx1"/>
+          </a:fontRef>
+        </p:style>
+      </p:cxnSp>
+      <p:cxnSp>
+        <p:nvCxnSpPr>
+          <p:cNvPr id="47" name="Straight Arrow Connector 46">
+            <a:extLst>
+              <a:ext uri="{FF2B5EF4-FFF2-40B4-BE49-F238E27FC236}">
+                <a16:creationId xmlns:a16="http://schemas.microsoft.com/office/drawing/2014/main" id="{1E0CB49C-5E03-6AE2-F9A7-DB4C84AA6903}"/>
+              </a:ext>
+            </a:extLst>
+          </p:cNvPr>
+          <p:cNvCxnSpPr>
+            <a:cxnSpLocks/>
+            <a:stCxn id="43" idx="3"/>
+          </p:cNvCxnSpPr>
+          <p:nvPr/>
+        </p:nvCxnSpPr>
+        <p:spPr>
+          <a:xfrm flipV="1">
+            <a:off x="7014706" y="1953771"/>
+            <a:ext cx="1148578" cy="24165"/>
+          </a:xfrm>
+          <a:prstGeom prst="straightConnector1">
+            <a:avLst/>
+          </a:prstGeom>
+          <a:ln w="12700">
+            <a:tailEnd type="triangle"/>
+          </a:ln>
+        </p:spPr>
+        <p:style>
+          <a:lnRef idx="1">
+            <a:schemeClr val="accent1"/>
+          </a:lnRef>
+          <a:fillRef idx="0">
+            <a:schemeClr val="accent1"/>
+          </a:fillRef>
+          <a:effectRef idx="0">
+            <a:schemeClr val="accent1"/>
+          </a:effectRef>
+          <a:fontRef idx="minor">
+            <a:schemeClr val="tx1"/>
+          </a:fontRef>
+        </p:style>
+      </p:cxnSp>
+      <p:sp>
+        <p:nvSpPr>
+          <p:cNvPr id="48" name="TextBox 47">
+            <a:extLst>
+              <a:ext uri="{FF2B5EF4-FFF2-40B4-BE49-F238E27FC236}">
+                <a16:creationId xmlns:a16="http://schemas.microsoft.com/office/drawing/2014/main" id="{C5C71C97-8F57-8C59-0E26-D678D0D4557B}"/>
+              </a:ext>
+            </a:extLst>
+          </p:cNvPr>
+          <p:cNvSpPr txBox="1"/>
+          <p:nvPr/>
+        </p:nvSpPr>
+        <p:spPr>
+          <a:xfrm>
+            <a:off x="2063606" y="1725657"/>
+            <a:ext cx="686023" cy="221599"/>
+          </a:xfrm>
+          <a:prstGeom prst="rect">
+            <a:avLst/>
+          </a:prstGeom>
+          <a:solidFill>
+            <a:schemeClr val="accent1">
+              <a:lumMod val="20000"/>
+              <a:lumOff val="80000"/>
+            </a:schemeClr>
+          </a:solidFill>
+        </p:spPr>
+        <p:txBody>
+          <a:bodyPr wrap="square" lIns="0" tIns="0" rIns="0" bIns="0" rtlCol="0">
+            <a:spAutoFit/>
+          </a:bodyPr>
+          <a:lstStyle/>
+          <a:p>
+            <a:pPr marL="0" indent="0" algn="l" defTabSz="914400" rtl="0" eaLnBrk="1" latinLnBrk="0" hangingPunct="1">
+              <a:lnSpc>
+                <a:spcPct val="90000"/>
+              </a:lnSpc>
+              <a:spcBef>
+                <a:spcPts val="0"/>
+              </a:spcBef>
+              <a:spcAft>
+                <a:spcPts val="600"/>
+              </a:spcAft>
+              <a:buFont typeface="Arial" panose="020B0604020202020204" pitchFamily="34" charset="0"/>
+              <a:buNone/>
+            </a:pPr>
+            <a:r>
+              <a:rPr lang="en-US" sz="1600" dirty="0">
+                <a:solidFill>
+                  <a:schemeClr val="tx2"/>
+                </a:solidFill>
+              </a:rPr>
+              <a:t>q</a:t>
+            </a:r>
+            <a:r>
+              <a:rPr lang="en-US" sz="1600" kern="1200" dirty="0">
+                <a:solidFill>
+                  <a:schemeClr val="tx2"/>
+                </a:solidFill>
+                <a:latin typeface="+mn-lt"/>
+                <a:ea typeface="+mn-ea"/>
+                <a:cs typeface="+mn-cs"/>
+              </a:rPr>
+              <a:t>15(11)</a:t>
+            </a:r>
+          </a:p>
+        </p:txBody>
+      </p:sp>
+      <p:sp>
+        <p:nvSpPr>
+          <p:cNvPr id="49" name="TextBox 48">
+            <a:extLst>
+              <a:ext uri="{FF2B5EF4-FFF2-40B4-BE49-F238E27FC236}">
+                <a16:creationId xmlns:a16="http://schemas.microsoft.com/office/drawing/2014/main" id="{B2E88FA0-598D-6862-E792-A18597289936}"/>
+              </a:ext>
+            </a:extLst>
+          </p:cNvPr>
+          <p:cNvSpPr txBox="1"/>
+          <p:nvPr/>
+        </p:nvSpPr>
+        <p:spPr>
+          <a:xfrm>
+            <a:off x="1827131" y="1768295"/>
+            <a:ext cx="145522" cy="221599"/>
+          </a:xfrm>
+          <a:prstGeom prst="rect">
+            <a:avLst/>
+          </a:prstGeom>
+          <a:noFill/>
+        </p:spPr>
+        <p:txBody>
+          <a:bodyPr wrap="square" lIns="0" tIns="0" rIns="0" bIns="0" rtlCol="0">
+            <a:spAutoFit/>
+          </a:bodyPr>
+          <a:lstStyle/>
+          <a:p>
+            <a:pPr marL="0" indent="0" algn="l" defTabSz="914400" rtl="0" eaLnBrk="1" latinLnBrk="0" hangingPunct="1">
+              <a:lnSpc>
+                <a:spcPct val="90000"/>
+              </a:lnSpc>
+              <a:spcBef>
+                <a:spcPts val="0"/>
+              </a:spcBef>
+              <a:spcAft>
+                <a:spcPts val="600"/>
+              </a:spcAft>
+              <a:buFont typeface="Arial" panose="020B0604020202020204" pitchFamily="34" charset="0"/>
+              <a:buNone/>
+            </a:pPr>
+            <a:r>
+              <a:rPr lang="en-US" sz="1600" dirty="0">
+                <a:solidFill>
+                  <a:schemeClr val="accent2">
+                    <a:lumMod val="75000"/>
+                    <a:lumOff val="25000"/>
+                  </a:schemeClr>
+                </a:solidFill>
+                <a:latin typeface="+mn-lt"/>
+                <a:ea typeface="+mn-ea"/>
+              </a:rPr>
+              <a:t>5</a:t>
+            </a:r>
+            <a:endParaRPr lang="en-US" sz="1600" kern="1200" dirty="0">
+              <a:solidFill>
+                <a:schemeClr val="accent2">
+                  <a:lumMod val="75000"/>
+                  <a:lumOff val="25000"/>
+                </a:schemeClr>
+              </a:solidFill>
+              <a:latin typeface="+mn-lt"/>
+              <a:ea typeface="+mn-ea"/>
+              <a:cs typeface="+mn-cs"/>
+            </a:endParaRPr>
+          </a:p>
+        </p:txBody>
+      </p:sp>
+      <p:sp>
+        <p:nvSpPr>
+          <p:cNvPr id="50" name="TextBox 49">
+            <a:extLst>
+              <a:ext uri="{FF2B5EF4-FFF2-40B4-BE49-F238E27FC236}">
+                <a16:creationId xmlns:a16="http://schemas.microsoft.com/office/drawing/2014/main" id="{FBFE86C2-5A64-F1D0-23D5-181EAE046C4F}"/>
+              </a:ext>
+            </a:extLst>
+          </p:cNvPr>
+          <p:cNvSpPr txBox="1"/>
+          <p:nvPr/>
+        </p:nvSpPr>
+        <p:spPr>
+          <a:xfrm>
+            <a:off x="4667653" y="1682722"/>
+            <a:ext cx="678456" cy="221599"/>
+          </a:xfrm>
+          <a:prstGeom prst="rect">
+            <a:avLst/>
+          </a:prstGeom>
+          <a:solidFill>
+            <a:schemeClr val="accent1">
+              <a:lumMod val="20000"/>
+              <a:lumOff val="80000"/>
+            </a:schemeClr>
+          </a:solidFill>
+        </p:spPr>
+        <p:txBody>
+          <a:bodyPr wrap="square" lIns="0" tIns="0" rIns="0" bIns="0" rtlCol="0">
+            <a:spAutoFit/>
+          </a:bodyPr>
+          <a:lstStyle/>
+          <a:p>
+            <a:pPr marL="0" indent="0" algn="l" defTabSz="914400" rtl="0" eaLnBrk="1" latinLnBrk="0" hangingPunct="1">
+              <a:lnSpc>
+                <a:spcPct val="90000"/>
+              </a:lnSpc>
+              <a:spcBef>
+                <a:spcPts val="0"/>
+              </a:spcBef>
+              <a:spcAft>
+                <a:spcPts val="600"/>
+              </a:spcAft>
+              <a:buFont typeface="Arial" panose="020B0604020202020204" pitchFamily="34" charset="0"/>
+              <a:buNone/>
+            </a:pPr>
+            <a:r>
+              <a:rPr lang="en-US" sz="1600">
+                <a:solidFill>
+                  <a:schemeClr val="tx2"/>
+                </a:solidFill>
+              </a:rPr>
+              <a:t>q</a:t>
+            </a:r>
+            <a:r>
+              <a:rPr lang="en-US" sz="1600" kern="1200">
+                <a:solidFill>
+                  <a:schemeClr val="tx2"/>
+                </a:solidFill>
+                <a:latin typeface="+mn-lt"/>
+                <a:ea typeface="+mn-ea"/>
+                <a:cs typeface="+mn-cs"/>
+              </a:rPr>
+              <a:t>15(11</a:t>
+            </a:r>
+            <a:r>
+              <a:rPr lang="en-US" sz="1600" kern="1200" dirty="0">
+                <a:solidFill>
+                  <a:schemeClr val="tx2"/>
+                </a:solidFill>
+                <a:latin typeface="+mn-lt"/>
+                <a:ea typeface="+mn-ea"/>
+                <a:cs typeface="+mn-cs"/>
+              </a:rPr>
+              <a:t>)</a:t>
+            </a:r>
+          </a:p>
+        </p:txBody>
+      </p:sp>
+      <p:sp>
+        <p:nvSpPr>
+          <p:cNvPr id="51" name="TextBox 50">
+            <a:extLst>
+              <a:ext uri="{FF2B5EF4-FFF2-40B4-BE49-F238E27FC236}">
+                <a16:creationId xmlns:a16="http://schemas.microsoft.com/office/drawing/2014/main" id="{E7907AC0-D85B-01CE-3BBB-2A576885AA99}"/>
+              </a:ext>
+            </a:extLst>
+          </p:cNvPr>
+          <p:cNvSpPr txBox="1"/>
+          <p:nvPr/>
+        </p:nvSpPr>
+        <p:spPr>
+          <a:xfrm>
+            <a:off x="7300468" y="1682722"/>
+            <a:ext cx="610267" cy="221599"/>
+          </a:xfrm>
+          <a:prstGeom prst="rect">
+            <a:avLst/>
+          </a:prstGeom>
+          <a:solidFill>
+            <a:schemeClr val="accent1">
+              <a:lumMod val="20000"/>
+              <a:lumOff val="80000"/>
+            </a:schemeClr>
+          </a:solidFill>
+        </p:spPr>
+        <p:txBody>
+          <a:bodyPr wrap="square" lIns="0" tIns="0" rIns="0" bIns="0" rtlCol="0">
+            <a:spAutoFit/>
+          </a:bodyPr>
+          <a:lstStyle/>
+          <a:p>
+            <a:pPr marL="0" indent="0" algn="l" defTabSz="914400" rtl="0" eaLnBrk="1" latinLnBrk="0" hangingPunct="1">
+              <a:lnSpc>
+                <a:spcPct val="90000"/>
+              </a:lnSpc>
+              <a:spcBef>
+                <a:spcPts val="0"/>
+              </a:spcBef>
+              <a:spcAft>
+                <a:spcPts val="600"/>
+              </a:spcAft>
+              <a:buFont typeface="Arial" panose="020B0604020202020204" pitchFamily="34" charset="0"/>
+              <a:buNone/>
+            </a:pPr>
+            <a:r>
+              <a:rPr lang="en-US" sz="1600" dirty="0">
+                <a:solidFill>
+                  <a:schemeClr val="tx2"/>
+                </a:solidFill>
+                <a:latin typeface="+mn-lt"/>
+                <a:ea typeface="+mn-ea"/>
+              </a:rPr>
+              <a:t>f32(10)</a:t>
+            </a:r>
+            <a:endParaRPr lang="en-US" sz="1600" kern="1200" dirty="0">
+              <a:solidFill>
+                <a:schemeClr val="tx2"/>
+              </a:solidFill>
+              <a:latin typeface="+mn-lt"/>
+              <a:ea typeface="+mn-ea"/>
+              <a:cs typeface="+mn-cs"/>
+            </a:endParaRPr>
+          </a:p>
+        </p:txBody>
+      </p:sp>
+      <p:sp>
+        <p:nvSpPr>
+          <p:cNvPr id="52" name="TextBox 51">
+            <a:extLst>
+              <a:ext uri="{FF2B5EF4-FFF2-40B4-BE49-F238E27FC236}">
+                <a16:creationId xmlns:a16="http://schemas.microsoft.com/office/drawing/2014/main" id="{10E8F85C-2881-5F08-2534-B0D307FB2006}"/>
+              </a:ext>
+            </a:extLst>
+          </p:cNvPr>
+          <p:cNvSpPr txBox="1"/>
+          <p:nvPr/>
+        </p:nvSpPr>
+        <p:spPr>
+          <a:xfrm>
+            <a:off x="2868612" y="2024869"/>
+            <a:ext cx="145522" cy="221599"/>
+          </a:xfrm>
+          <a:prstGeom prst="rect">
+            <a:avLst/>
+          </a:prstGeom>
+          <a:noFill/>
+        </p:spPr>
+        <p:txBody>
+          <a:bodyPr wrap="square" lIns="0" tIns="0" rIns="0" bIns="0" rtlCol="0">
+            <a:spAutoFit/>
+          </a:bodyPr>
+          <a:lstStyle/>
+          <a:p>
+            <a:pPr marL="0" indent="0" algn="l" defTabSz="914400" rtl="0" eaLnBrk="1" latinLnBrk="0" hangingPunct="1">
+              <a:lnSpc>
+                <a:spcPct val="90000"/>
+              </a:lnSpc>
+              <a:spcBef>
+                <a:spcPts val="0"/>
+              </a:spcBef>
+              <a:spcAft>
+                <a:spcPts val="600"/>
+              </a:spcAft>
+              <a:buFont typeface="Arial" panose="020B0604020202020204" pitchFamily="34" charset="0"/>
+              <a:buNone/>
+            </a:pPr>
+            <a:r>
+              <a:rPr lang="en-US" sz="1600" kern="1200">
+                <a:solidFill>
+                  <a:schemeClr val="accent2">
+                    <a:lumMod val="75000"/>
+                    <a:lumOff val="25000"/>
+                  </a:schemeClr>
+                </a:solidFill>
+                <a:latin typeface="+mn-lt"/>
+                <a:ea typeface="+mn-ea"/>
+                <a:cs typeface="+mn-cs"/>
+              </a:rPr>
+              <a:t>7</a:t>
+            </a:r>
+          </a:p>
+        </p:txBody>
+      </p:sp>
+      <p:sp>
+        <p:nvSpPr>
+          <p:cNvPr id="53" name="TextBox 52">
+            <a:extLst>
+              <a:ext uri="{FF2B5EF4-FFF2-40B4-BE49-F238E27FC236}">
+                <a16:creationId xmlns:a16="http://schemas.microsoft.com/office/drawing/2014/main" id="{63B3D46E-06F9-1B00-27F5-6FCFAE740F96}"/>
+              </a:ext>
+            </a:extLst>
+          </p:cNvPr>
+          <p:cNvSpPr txBox="1"/>
+          <p:nvPr/>
+        </p:nvSpPr>
+        <p:spPr>
+          <a:xfrm>
+            <a:off x="4403339" y="1743090"/>
+            <a:ext cx="145522" cy="221599"/>
+          </a:xfrm>
+          <a:prstGeom prst="rect">
+            <a:avLst/>
+          </a:prstGeom>
+          <a:noFill/>
+        </p:spPr>
+        <p:txBody>
+          <a:bodyPr wrap="square" lIns="0" tIns="0" rIns="0" bIns="0" rtlCol="0">
+            <a:spAutoFit/>
+          </a:bodyPr>
+          <a:lstStyle/>
+          <a:p>
+            <a:pPr marL="0" indent="0" algn="l" defTabSz="914400" rtl="0" eaLnBrk="1" latinLnBrk="0" hangingPunct="1">
+              <a:lnSpc>
+                <a:spcPct val="90000"/>
+              </a:lnSpc>
+              <a:spcBef>
+                <a:spcPts val="0"/>
+              </a:spcBef>
+              <a:spcAft>
+                <a:spcPts val="600"/>
+              </a:spcAft>
+              <a:buFont typeface="Arial" panose="020B0604020202020204" pitchFamily="34" charset="0"/>
+              <a:buNone/>
+            </a:pPr>
+            <a:r>
+              <a:rPr lang="en-US" sz="1600" kern="1200">
+                <a:solidFill>
+                  <a:schemeClr val="accent2">
+                    <a:lumMod val="75000"/>
+                    <a:lumOff val="25000"/>
+                  </a:schemeClr>
+                </a:solidFill>
+                <a:latin typeface="+mn-lt"/>
+                <a:ea typeface="+mn-ea"/>
+                <a:cs typeface="+mn-cs"/>
+              </a:rPr>
+              <a:t>7</a:t>
+            </a:r>
+          </a:p>
+        </p:txBody>
+      </p:sp>
+      <p:sp>
+        <p:nvSpPr>
+          <p:cNvPr id="54" name="TextBox 53">
+            <a:extLst>
+              <a:ext uri="{FF2B5EF4-FFF2-40B4-BE49-F238E27FC236}">
+                <a16:creationId xmlns:a16="http://schemas.microsoft.com/office/drawing/2014/main" id="{B2769B4C-DE49-E772-F67E-D4533364E415}"/>
+              </a:ext>
+            </a:extLst>
+          </p:cNvPr>
+          <p:cNvSpPr txBox="1"/>
+          <p:nvPr/>
+        </p:nvSpPr>
+        <p:spPr>
+          <a:xfrm>
+            <a:off x="5496558" y="1989894"/>
+            <a:ext cx="145522" cy="221599"/>
+          </a:xfrm>
+          <a:prstGeom prst="rect">
+            <a:avLst/>
+          </a:prstGeom>
+          <a:noFill/>
+        </p:spPr>
+        <p:txBody>
+          <a:bodyPr wrap="square" lIns="0" tIns="0" rIns="0" bIns="0" rtlCol="0">
+            <a:spAutoFit/>
+          </a:bodyPr>
+          <a:lstStyle/>
+          <a:p>
+            <a:pPr marL="0" indent="0" algn="l" defTabSz="914400" rtl="0" eaLnBrk="1" latinLnBrk="0" hangingPunct="1">
+              <a:lnSpc>
+                <a:spcPct val="90000"/>
+              </a:lnSpc>
+              <a:spcBef>
+                <a:spcPts val="0"/>
+              </a:spcBef>
+              <a:spcAft>
+                <a:spcPts val="600"/>
+              </a:spcAft>
+              <a:buFont typeface="Arial" panose="020B0604020202020204" pitchFamily="34" charset="0"/>
+              <a:buNone/>
+            </a:pPr>
+            <a:r>
+              <a:rPr lang="en-US" sz="1600" dirty="0">
+                <a:solidFill>
+                  <a:schemeClr val="accent2">
+                    <a:lumMod val="75000"/>
+                    <a:lumOff val="25000"/>
+                  </a:schemeClr>
+                </a:solidFill>
+              </a:rPr>
+              <a:t>5</a:t>
+            </a:r>
+            <a:endParaRPr lang="en-US" sz="1600" kern="1200" dirty="0">
+              <a:solidFill>
+                <a:schemeClr val="accent2">
+                  <a:lumMod val="75000"/>
+                  <a:lumOff val="25000"/>
+                </a:schemeClr>
+              </a:solidFill>
+              <a:latin typeface="+mn-lt"/>
+              <a:ea typeface="+mn-ea"/>
+              <a:cs typeface="+mn-cs"/>
+            </a:endParaRPr>
+          </a:p>
+        </p:txBody>
+      </p:sp>
+      <p:sp>
+        <p:nvSpPr>
+          <p:cNvPr id="55" name="TextBox 54">
+            <a:extLst>
+              <a:ext uri="{FF2B5EF4-FFF2-40B4-BE49-F238E27FC236}">
+                <a16:creationId xmlns:a16="http://schemas.microsoft.com/office/drawing/2014/main" id="{7C7478B6-9960-5FD6-E238-AC24E3FCFE90}"/>
+              </a:ext>
+            </a:extLst>
+          </p:cNvPr>
+          <p:cNvSpPr txBox="1"/>
+          <p:nvPr/>
+        </p:nvSpPr>
+        <p:spPr>
+          <a:xfrm>
+            <a:off x="7037888" y="1750536"/>
+            <a:ext cx="145522" cy="221599"/>
+          </a:xfrm>
+          <a:prstGeom prst="rect">
+            <a:avLst/>
+          </a:prstGeom>
+          <a:noFill/>
+        </p:spPr>
+        <p:txBody>
+          <a:bodyPr wrap="square" lIns="0" tIns="0" rIns="0" bIns="0" rtlCol="0">
+            <a:spAutoFit/>
+          </a:bodyPr>
+          <a:lstStyle/>
+          <a:p>
+            <a:pPr marL="0" indent="0" algn="l" defTabSz="914400" rtl="0" eaLnBrk="1" latinLnBrk="0" hangingPunct="1">
+              <a:lnSpc>
+                <a:spcPct val="90000"/>
+              </a:lnSpc>
+              <a:spcBef>
+                <a:spcPts val="0"/>
+              </a:spcBef>
+              <a:spcAft>
+                <a:spcPts val="600"/>
+              </a:spcAft>
+              <a:buFont typeface="Arial" panose="020B0604020202020204" pitchFamily="34" charset="0"/>
+              <a:buNone/>
+            </a:pPr>
+            <a:r>
+              <a:rPr lang="en-US" sz="1600" kern="1200">
+                <a:solidFill>
+                  <a:schemeClr val="accent2">
+                    <a:lumMod val="75000"/>
+                    <a:lumOff val="25000"/>
+                  </a:schemeClr>
+                </a:solidFill>
+                <a:latin typeface="+mn-lt"/>
+                <a:ea typeface="+mn-ea"/>
+                <a:cs typeface="+mn-cs"/>
+              </a:rPr>
+              <a:t>2</a:t>
+            </a:r>
+          </a:p>
+        </p:txBody>
+      </p:sp>
+      <p:sp>
+        <p:nvSpPr>
+          <p:cNvPr id="56" name="TextBox 55">
+            <a:extLst>
+              <a:ext uri="{FF2B5EF4-FFF2-40B4-BE49-F238E27FC236}">
+                <a16:creationId xmlns:a16="http://schemas.microsoft.com/office/drawing/2014/main" id="{CC8FE182-CEA0-0D09-75D8-A53A34706CA7}"/>
+              </a:ext>
+            </a:extLst>
+          </p:cNvPr>
+          <p:cNvSpPr txBox="1"/>
+          <p:nvPr/>
+        </p:nvSpPr>
+        <p:spPr>
+          <a:xfrm>
+            <a:off x="7910735" y="1967023"/>
+            <a:ext cx="308235" cy="221599"/>
+          </a:xfrm>
+          <a:prstGeom prst="rect">
+            <a:avLst/>
+          </a:prstGeom>
+          <a:noFill/>
+        </p:spPr>
+        <p:txBody>
+          <a:bodyPr wrap="square" lIns="0" tIns="0" rIns="0" bIns="0" rtlCol="0">
+            <a:spAutoFit/>
+          </a:bodyPr>
+          <a:lstStyle/>
+          <a:p>
+            <a:pPr marL="0" indent="0" algn="l" defTabSz="914400" rtl="0" eaLnBrk="1" latinLnBrk="0" hangingPunct="1">
+              <a:lnSpc>
+                <a:spcPct val="90000"/>
+              </a:lnSpc>
+              <a:spcBef>
+                <a:spcPts val="0"/>
+              </a:spcBef>
+              <a:spcAft>
+                <a:spcPts val="600"/>
+              </a:spcAft>
+              <a:buFont typeface="Arial" panose="020B0604020202020204" pitchFamily="34" charset="0"/>
+              <a:buNone/>
+            </a:pPr>
+            <a:r>
+              <a:rPr lang="en-US" sz="1600" kern="1200" dirty="0">
+                <a:solidFill>
+                  <a:schemeClr val="accent2">
+                    <a:lumMod val="75000"/>
+                    <a:lumOff val="25000"/>
+                  </a:schemeClr>
+                </a:solidFill>
+                <a:latin typeface="+mn-lt"/>
+                <a:ea typeface="+mn-ea"/>
+                <a:cs typeface="+mn-cs"/>
+              </a:rPr>
+              <a:t>10</a:t>
+            </a:r>
+          </a:p>
+        </p:txBody>
+      </p:sp>
+      <p:sp>
+        <p:nvSpPr>
+          <p:cNvPr id="68" name="Callout: Bent Line with No Border 67">
+            <a:extLst>
+              <a:ext uri="{FF2B5EF4-FFF2-40B4-BE49-F238E27FC236}">
+                <a16:creationId xmlns:a16="http://schemas.microsoft.com/office/drawing/2014/main" id="{0AC9C751-BED2-4F91-CD5A-C5DA0D6B6929}"/>
+              </a:ext>
+            </a:extLst>
+          </p:cNvPr>
+          <p:cNvSpPr/>
+          <p:nvPr/>
+        </p:nvSpPr>
+        <p:spPr>
+          <a:xfrm>
+            <a:off x="2378882" y="1056110"/>
+            <a:ext cx="1919603" cy="129121"/>
+          </a:xfrm>
+          <a:prstGeom prst="callout2">
+            <a:avLst>
+              <a:gd name="adj1" fmla="val 18750"/>
+              <a:gd name="adj2" fmla="val -8333"/>
+              <a:gd name="adj3" fmla="val 18750"/>
+              <a:gd name="adj4" fmla="val -16667"/>
+              <a:gd name="adj5" fmla="val 533298"/>
+              <a:gd name="adj6" fmla="val -26647"/>
+            </a:avLst>
+          </a:prstGeom>
+          <a:solidFill>
+            <a:schemeClr val="bg1"/>
+          </a:solidFill>
+          <a:ln>
+            <a:solidFill>
+              <a:schemeClr val="accent3">
+                <a:lumMod val="75000"/>
+              </a:schemeClr>
+            </a:solidFill>
+          </a:ln>
+        </p:spPr>
+        <p:style>
+          <a:lnRef idx="2">
+            <a:schemeClr val="accent1">
+              <a:shade val="50000"/>
+            </a:schemeClr>
+          </a:lnRef>
+          <a:fillRef idx="1">
+            <a:schemeClr val="accent1"/>
+          </a:fillRef>
+          <a:effectRef idx="0">
+            <a:schemeClr val="accent1"/>
+          </a:effectRef>
+          <a:fontRef idx="minor">
+            <a:schemeClr val="lt1"/>
+          </a:fontRef>
+        </p:style>
+        <p:txBody>
+          <a:bodyPr rtlCol="0" anchor="ctr"/>
+          <a:lstStyle/>
+          <a:p>
+            <a:endParaRPr lang="en-US" sz="1400" dirty="0">
+              <a:solidFill>
+                <a:schemeClr val="tx1"/>
+              </a:solidFill>
+            </a:endParaRPr>
+          </a:p>
+        </p:txBody>
+      </p:sp>
+      <p:sp>
+        <p:nvSpPr>
+          <p:cNvPr id="69" name="TextBox 68">
+            <a:extLst>
+              <a:ext uri="{FF2B5EF4-FFF2-40B4-BE49-F238E27FC236}">
+                <a16:creationId xmlns:a16="http://schemas.microsoft.com/office/drawing/2014/main" id="{5828F78A-2809-95F9-1536-479985A53B83}"/>
+              </a:ext>
+            </a:extLst>
+          </p:cNvPr>
+          <p:cNvSpPr txBox="1"/>
+          <p:nvPr/>
+        </p:nvSpPr>
+        <p:spPr>
+          <a:xfrm>
+            <a:off x="2309568" y="1004919"/>
+            <a:ext cx="1824272" cy="193899"/>
+          </a:xfrm>
+          <a:prstGeom prst="rect">
+            <a:avLst/>
+          </a:prstGeom>
+          <a:noFill/>
+        </p:spPr>
+        <p:txBody>
+          <a:bodyPr wrap="square" lIns="0" tIns="0" rIns="0" bIns="0" rtlCol="0">
+            <a:spAutoFit/>
+          </a:bodyPr>
+          <a:lstStyle/>
+          <a:p>
+            <a:pPr marL="0" indent="0" algn="l" defTabSz="914400" rtl="0" eaLnBrk="1" latinLnBrk="0" hangingPunct="1">
+              <a:lnSpc>
+                <a:spcPct val="90000"/>
+              </a:lnSpc>
+              <a:spcBef>
+                <a:spcPts val="0"/>
+              </a:spcBef>
+              <a:spcAft>
+                <a:spcPts val="600"/>
+              </a:spcAft>
+              <a:buFont typeface="Arial" panose="020B0604020202020204" pitchFamily="34" charset="0"/>
+              <a:buNone/>
+            </a:pPr>
+            <a:r>
+              <a:rPr lang="en-US" sz="1400" kern="1200" dirty="0">
+                <a:solidFill>
+                  <a:schemeClr val="tx2"/>
+                </a:solidFill>
+                <a:latin typeface="+mn-lt"/>
+                <a:ea typeface="+mn-ea"/>
+                <a:cs typeface="+mn-cs"/>
+              </a:rPr>
+              <a:t>Number of samples</a:t>
+            </a:r>
+          </a:p>
+        </p:txBody>
+      </p:sp>
+      <p:sp>
+        <p:nvSpPr>
+          <p:cNvPr id="70" name="Callout: Bent Line with No Border 69">
+            <a:extLst>
+              <a:ext uri="{FF2B5EF4-FFF2-40B4-BE49-F238E27FC236}">
+                <a16:creationId xmlns:a16="http://schemas.microsoft.com/office/drawing/2014/main" id="{29A5482D-EF26-9812-CC17-3868F6ABF791}"/>
+              </a:ext>
+            </a:extLst>
+          </p:cNvPr>
+          <p:cNvSpPr/>
+          <p:nvPr/>
+        </p:nvSpPr>
+        <p:spPr>
+          <a:xfrm>
+            <a:off x="5268216" y="1063811"/>
+            <a:ext cx="1919603" cy="129121"/>
+          </a:xfrm>
+          <a:prstGeom prst="callout2">
+            <a:avLst>
+              <a:gd name="adj1" fmla="val 18750"/>
+              <a:gd name="adj2" fmla="val -8333"/>
+              <a:gd name="adj3" fmla="val 18750"/>
+              <a:gd name="adj4" fmla="val -16667"/>
+              <a:gd name="adj5" fmla="val 440928"/>
+              <a:gd name="adj6" fmla="val -26647"/>
+            </a:avLst>
+          </a:prstGeom>
+          <a:solidFill>
+            <a:schemeClr val="bg1"/>
+          </a:solidFill>
+          <a:ln>
+            <a:solidFill>
+              <a:schemeClr val="accent3">
+                <a:lumMod val="75000"/>
+              </a:schemeClr>
+            </a:solidFill>
+          </a:ln>
+        </p:spPr>
+        <p:style>
+          <a:lnRef idx="2">
+            <a:schemeClr val="accent1">
+              <a:shade val="50000"/>
+            </a:schemeClr>
+          </a:lnRef>
+          <a:fillRef idx="1">
+            <a:schemeClr val="accent1"/>
+          </a:fillRef>
+          <a:effectRef idx="0">
+            <a:schemeClr val="accent1"/>
+          </a:effectRef>
+          <a:fontRef idx="minor">
+            <a:schemeClr val="lt1"/>
+          </a:fontRef>
+        </p:style>
+        <p:txBody>
+          <a:bodyPr rtlCol="0" anchor="ctr"/>
+          <a:lstStyle/>
+          <a:p>
+            <a:endParaRPr lang="en-US" sz="1400" dirty="0">
+              <a:solidFill>
+                <a:schemeClr val="tx1"/>
+              </a:solidFill>
+            </a:endParaRPr>
+          </a:p>
+        </p:txBody>
+      </p:sp>
+      <p:sp>
+        <p:nvSpPr>
+          <p:cNvPr id="71" name="TextBox 70">
+            <a:extLst>
+              <a:ext uri="{FF2B5EF4-FFF2-40B4-BE49-F238E27FC236}">
+                <a16:creationId xmlns:a16="http://schemas.microsoft.com/office/drawing/2014/main" id="{477EC8AD-E0C6-0267-36B2-20A2CFBFF8DB}"/>
+              </a:ext>
+            </a:extLst>
+          </p:cNvPr>
+          <p:cNvSpPr txBox="1"/>
+          <p:nvPr/>
+        </p:nvSpPr>
+        <p:spPr>
+          <a:xfrm>
+            <a:off x="5190434" y="984474"/>
+            <a:ext cx="1824272" cy="215444"/>
+          </a:xfrm>
+          <a:prstGeom prst="rect">
+            <a:avLst/>
+          </a:prstGeom>
+          <a:noFill/>
+        </p:spPr>
+        <p:txBody>
+          <a:bodyPr wrap="square" lIns="0" tIns="0" rIns="0" bIns="0" rtlCol="0">
+            <a:spAutoFit/>
+          </a:bodyPr>
+          <a:lstStyle/>
+          <a:p>
+            <a:r>
+              <a:rPr lang="en-US" sz="1400" dirty="0">
+                <a:solidFill>
+                  <a:schemeClr val="tx1"/>
+                </a:solidFill>
+              </a:rPr>
+              <a:t>Data type (buffer size)</a:t>
+            </a:r>
+          </a:p>
+        </p:txBody>
+      </p:sp>
+    </p:spTree>
+    <p:extLst>
+      <p:ext uri="{BB962C8B-B14F-4D97-AF65-F5344CB8AC3E}">
+        <p14:creationId xmlns:p14="http://schemas.microsoft.com/office/powerpoint/2010/main" val="1067095382"/>
       </p:ext>
     </p:extLst>
   </p:cSld>

</xml_diff>